<commit_message>
(Most of) methodology added
</commit_message>
<xml_diff>
--- a/Project Poster.pptx
+++ b/Project Poster.pptx
@@ -246,7 +246,7 @@
       <p15:sldGuideLst xmlns:p15="http://schemas.microsoft.com/office/powerpoint/2012/main"/>
     </p:ext>
     <p:ext uri="http://customooxmlschemas.google.com/">
-      <go:slidesCustomData xmlns:go="http://customooxmlschemas.google.com/" xmlns:p15="http://schemas.microsoft.com/office/powerpoint/2012/main" xmlns:p14="http://schemas.microsoft.com/office/powerpoint/2010/main" xmlns:com="http://schemas.openxmlformats.org/drawingml/2006/compatibility" xmlns:pvml="urn:schemas-microsoft-com:office:powerpoint" xmlns:v="urn:schemas-microsoft-com:vml" xmlns:o="urn:schemas-microsoft-com:office:office" xmlns:dgm="http://schemas.openxmlformats.org/drawingml/2006/diagram" xmlns:c="http://schemas.openxmlformats.org/drawingml/2006/chart" xmlns:mv="urn:schemas-microsoft-com:mac:vml" xmlns:mc="http://schemas.openxmlformats.org/markup-compatibility/2006" xmlns="" r:id="rId7" roundtripDataSignature="AMtx7mia2HK9xto4cWUpRqy9HTZm6ngvMQ=="/>
+      <go:slidesCustomData xmlns="" xmlns:mc="http://schemas.openxmlformats.org/markup-compatibility/2006" xmlns:mv="urn:schemas-microsoft-com:mac:vml" xmlns:c="http://schemas.openxmlformats.org/drawingml/2006/chart" xmlns:dgm="http://schemas.openxmlformats.org/drawingml/2006/diagram" xmlns:o="urn:schemas-microsoft-com:office:office" xmlns:v="urn:schemas-microsoft-com:vml" xmlns:pvml="urn:schemas-microsoft-com:office:powerpoint" xmlns:com="http://schemas.openxmlformats.org/drawingml/2006/compatibility" xmlns:p14="http://schemas.microsoft.com/office/powerpoint/2010/main" xmlns:p15="http://schemas.microsoft.com/office/powerpoint/2012/main" xmlns:go="http://customooxmlschemas.google.com/" r:id="rId7" roundtripDataSignature="AMtx7mia2HK9xto4cWUpRqy9HTZm6ngvMQ=="/>
     </p:ext>
   </p:extLst>
 </p:presentation>
@@ -10840,7 +10840,7 @@
         </p:nvSpPr>
         <p:spPr>
           <a:xfrm>
-            <a:off x="1748038" y="11750076"/>
+            <a:off x="1835725" y="11338163"/>
             <a:ext cx="7670100" cy="605382"/>
           </a:xfrm>
           <a:prstGeom prst="rect">
@@ -10938,78 +10938,526 @@
           </a:p>
         </p:txBody>
       </p:sp>
-      <p:sp>
-        <p:nvSpPr>
-          <p:cNvPr id="93" name="Google Shape;93;p1"/>
-          <p:cNvSpPr txBox="1"/>
-          <p:nvPr/>
-        </p:nvSpPr>
-        <p:spPr>
-          <a:xfrm>
-            <a:off x="1748038" y="12854787"/>
-            <a:ext cx="7670100" cy="1446509"/>
-          </a:xfrm>
-          <a:prstGeom prst="rect">
-            <a:avLst/>
-          </a:prstGeom>
-          <a:noFill/>
-          <a:ln>
-            <a:noFill/>
-          </a:ln>
-        </p:spPr>
-        <p:txBody>
-          <a:bodyPr spcFirstLastPara="1" wrap="square" lIns="91425" tIns="45700" rIns="91425" bIns="45700" anchor="t" anchorCtr="0">
-            <a:spAutoFit/>
-          </a:bodyPr>
-          <a:lstStyle/>
-          <a:p>
-            <a:pPr lvl="0"/>
-            <a:r>
-              <a:rPr lang="en-US" sz="2200" b="1" dirty="0">
-                <a:solidFill>
-                  <a:schemeClr val="dk1"/>
-                </a:solidFill>
-                <a:latin typeface="Calibri"/>
-                <a:ea typeface="Calibri"/>
-                <a:cs typeface="Calibri"/>
-                <a:sym typeface="Calibri"/>
-              </a:rPr>
-              <a:t>Describe succinctly your approach</a:t>
-            </a:r>
-          </a:p>
-          <a:p>
-            <a:pPr lvl="0"/>
-            <a:r>
-              <a:rPr lang="en-US" sz="2200" b="1" dirty="0">
-                <a:solidFill>
-                  <a:schemeClr val="dk1"/>
-                </a:solidFill>
-                <a:latin typeface="Calibri"/>
-                <a:ea typeface="Calibri"/>
-                <a:cs typeface="Calibri"/>
-                <a:sym typeface="Calibri"/>
-              </a:rPr>
-              <a:t>Describe inputs/outputs/data/components/tools (e.g. BDS) utilized</a:t>
-            </a:r>
-          </a:p>
-          <a:p>
-            <a:pPr lvl="0"/>
-            <a:r>
-              <a:rPr lang="en-US" sz="2200" b="1" dirty="0">
-                <a:solidFill>
-                  <a:schemeClr val="dk1"/>
-                </a:solidFill>
-                <a:latin typeface="Calibri"/>
-                <a:ea typeface="Calibri"/>
-                <a:cs typeface="Calibri"/>
-                <a:sym typeface="Calibri"/>
-              </a:rPr>
-              <a:t>Contrast with existing literature/state of the art </a:t>
-            </a:r>
-            <a:endParaRPr sz="2200" b="1" dirty="0"/>
-          </a:p>
-        </p:txBody>
-      </p:sp>
+      <mc:AlternateContent xmlns:mc="http://schemas.openxmlformats.org/markup-compatibility/2006">
+        <mc:Choice xmlns:a14="http://schemas.microsoft.com/office/drawing/2010/main" Requires="a14">
+          <p:sp>
+            <p:nvSpPr>
+              <p:cNvPr id="93" name="Google Shape;93;p1"/>
+              <p:cNvSpPr txBox="1"/>
+              <p:nvPr/>
+            </p:nvSpPr>
+            <p:spPr>
+              <a:xfrm>
+                <a:off x="1765400" y="12566163"/>
+                <a:ext cx="7670100" cy="7201931"/>
+              </a:xfrm>
+              <a:prstGeom prst="rect">
+                <a:avLst/>
+              </a:prstGeom>
+              <a:noFill/>
+              <a:ln>
+                <a:noFill/>
+              </a:ln>
+            </p:spPr>
+            <p:txBody>
+              <a:bodyPr spcFirstLastPara="1" wrap="square" lIns="91425" tIns="45700" rIns="91425" bIns="45700" anchor="t" anchorCtr="0">
+                <a:spAutoFit/>
+              </a:bodyPr>
+              <a:lstStyle/>
+              <a:p>
+                <a:pPr lvl="0"/>
+                <a:r>
+                  <a:rPr lang="en-US" sz="2200" b="1" dirty="0">
+                    <a:solidFill>
+                      <a:schemeClr val="dk1"/>
+                    </a:solidFill>
+                    <a:latin typeface="Calibri"/>
+                    <a:ea typeface="Calibri"/>
+                    <a:cs typeface="Calibri"/>
+                    <a:sym typeface="Calibri"/>
+                  </a:rPr>
+                  <a:t>Describe succinctly your approach</a:t>
+                </a:r>
+                <a:endParaRPr lang="en-US" sz="2200" dirty="0">
+                  <a:solidFill>
+                    <a:schemeClr val="dk1"/>
+                  </a:solidFill>
+                  <a:latin typeface="Calibri"/>
+                  <a:ea typeface="Calibri"/>
+                  <a:cs typeface="Calibri"/>
+                  <a:sym typeface="Calibri"/>
+                </a:endParaRPr>
+              </a:p>
+              <a:p>
+                <a:pPr lvl="0"/>
+                <a:r>
+                  <a:rPr lang="en-US" sz="2200" b="1" dirty="0">
+                    <a:solidFill>
+                      <a:schemeClr val="dk1"/>
+                    </a:solidFill>
+                    <a:latin typeface="Calibri"/>
+                    <a:ea typeface="Calibri"/>
+                    <a:cs typeface="Calibri"/>
+                    <a:sym typeface="Calibri"/>
+                  </a:rPr>
+                  <a:t>Describe inputs/outputs/data/components/tools (e.g. BDS) utilized</a:t>
+                </a:r>
+              </a:p>
+              <a:p>
+                <a:pPr lvl="0"/>
+                <a:r>
+                  <a:rPr lang="en-US" sz="2200" b="1" dirty="0">
+                    <a:solidFill>
+                      <a:schemeClr val="dk1"/>
+                    </a:solidFill>
+                    <a:latin typeface="Calibri"/>
+                    <a:ea typeface="Calibri"/>
+                    <a:cs typeface="Calibri"/>
+                    <a:sym typeface="Calibri"/>
+                  </a:rPr>
+                  <a:t>Contrast with existing literature/state of the art </a:t>
+                </a:r>
+              </a:p>
+              <a:p>
+                <a:pPr lvl="0"/>
+                <a:endParaRPr lang="en-US" sz="2200" dirty="0">
+                  <a:solidFill>
+                    <a:schemeClr val="dk1"/>
+                  </a:solidFill>
+                  <a:latin typeface="Calibri"/>
+                  <a:cs typeface="Calibri"/>
+                  <a:sym typeface="Calibri"/>
+                </a:endParaRPr>
+              </a:p>
+              <a:p>
+                <a:pPr lvl="0"/>
+                <a:r>
+                  <a:rPr lang="en-US" sz="2200" dirty="0">
+                    <a:solidFill>
+                      <a:schemeClr val="dk1"/>
+                    </a:solidFill>
+                    <a:latin typeface="Calibri"/>
+                    <a:cs typeface="Calibri"/>
+                    <a:sym typeface="Calibri"/>
+                  </a:rPr>
+                  <a:t>As a “ground truth” we use the simulation results of the BDS (battery design studio) default NiMH cell ECM. We then compare the results of this to the results using a simple mathematical model for efficiency:</a:t>
+                </a:r>
+              </a:p>
+              <a:p>
+                <a:pPr lvl="0"/>
+                <a14:m>
+                  <m:oMathPara xmlns:m="http://schemas.openxmlformats.org/officeDocument/2006/math">
+                    <m:oMathParaPr>
+                      <m:jc m:val="centerGroup"/>
+                    </m:oMathParaPr>
+                    <m:oMath xmlns:m="http://schemas.openxmlformats.org/officeDocument/2006/math">
+                      <m:sSub>
+                        <m:sSubPr>
+                          <m:ctrlPr>
+                            <a:rPr lang="en-US" sz="2200" b="0" i="1" smtClean="0">
+                              <a:latin typeface="Cambria Math" panose="02040503050406030204" pitchFamily="18" charset="0"/>
+                            </a:rPr>
+                          </m:ctrlPr>
+                        </m:sSubPr>
+                        <m:e>
+                          <m:r>
+                            <a:rPr lang="en-US" sz="2200" b="0" i="1" smtClean="0">
+                              <a:latin typeface="Cambria Math" panose="02040503050406030204" pitchFamily="18" charset="0"/>
+                            </a:rPr>
+                            <m:t>𝑄</m:t>
+                          </m:r>
+                        </m:e>
+                        <m:sub>
+                          <m:r>
+                            <a:rPr lang="en-US" sz="2200" b="0" i="1" smtClean="0">
+                              <a:latin typeface="Cambria Math" panose="02040503050406030204" pitchFamily="18" charset="0"/>
+                            </a:rPr>
+                            <m:t>𝑡</m:t>
+                          </m:r>
+                        </m:sub>
+                      </m:sSub>
+                      <m:r>
+                        <a:rPr lang="en-US" sz="2200" b="0" i="1" smtClean="0">
+                          <a:latin typeface="Cambria Math" panose="02040503050406030204" pitchFamily="18" charset="0"/>
+                        </a:rPr>
+                        <m:t>=</m:t>
+                      </m:r>
+                      <m:sSub>
+                        <m:sSubPr>
+                          <m:ctrlPr>
+                            <a:rPr lang="en-US" sz="2200" b="0" i="1" smtClean="0">
+                              <a:latin typeface="Cambria Math" panose="02040503050406030204" pitchFamily="18" charset="0"/>
+                            </a:rPr>
+                          </m:ctrlPr>
+                        </m:sSubPr>
+                        <m:e>
+                          <m:r>
+                            <a:rPr lang="en-US" sz="2200" b="0" i="1" smtClean="0">
+                              <a:latin typeface="Cambria Math" panose="02040503050406030204" pitchFamily="18" charset="0"/>
+                            </a:rPr>
+                            <m:t>𝑄</m:t>
+                          </m:r>
+                        </m:e>
+                        <m:sub>
+                          <m:r>
+                            <a:rPr lang="en-US" sz="2200" b="0" i="1" smtClean="0">
+                              <a:latin typeface="Cambria Math" panose="02040503050406030204" pitchFamily="18" charset="0"/>
+                            </a:rPr>
+                            <m:t>𝑡</m:t>
+                          </m:r>
+                          <m:r>
+                            <a:rPr lang="en-US" sz="2200" b="0" i="1" smtClean="0">
+                              <a:latin typeface="Cambria Math" panose="02040503050406030204" pitchFamily="18" charset="0"/>
+                            </a:rPr>
+                            <m:t>−1</m:t>
+                          </m:r>
+                        </m:sub>
+                      </m:sSub>
+                      <m:r>
+                        <a:rPr lang="en-US" sz="2200" b="0" i="1" smtClean="0">
+                          <a:latin typeface="Cambria Math" panose="02040503050406030204" pitchFamily="18" charset="0"/>
+                        </a:rPr>
+                        <m:t>+ </m:t>
+                      </m:r>
+                      <m:sSub>
+                        <m:sSubPr>
+                          <m:ctrlPr>
+                            <a:rPr lang="en-US" sz="2200" b="0" i="1" smtClean="0">
+                              <a:latin typeface="Cambria Math" panose="02040503050406030204" pitchFamily="18" charset="0"/>
+                            </a:rPr>
+                          </m:ctrlPr>
+                        </m:sSubPr>
+                        <m:e>
+                          <m:r>
+                            <a:rPr lang="en-US" sz="2200" b="0" i="1" smtClean="0">
+                              <a:latin typeface="Cambria Math" panose="02040503050406030204" pitchFamily="18" charset="0"/>
+                              <a:ea typeface="Cambria Math" panose="02040503050406030204" pitchFamily="18" charset="0"/>
+                            </a:rPr>
+                            <m:t>𝛾</m:t>
+                          </m:r>
+                        </m:e>
+                        <m:sub>
+                          <m:r>
+                            <a:rPr lang="en-US" sz="2200" b="0" i="1" smtClean="0">
+                              <a:latin typeface="Cambria Math" panose="02040503050406030204" pitchFamily="18" charset="0"/>
+                            </a:rPr>
+                            <m:t>𝑐</m:t>
+                          </m:r>
+                        </m:sub>
+                      </m:sSub>
+                      <m:sSub>
+                        <m:sSubPr>
+                          <m:ctrlPr>
+                            <a:rPr lang="en-US" sz="2200" b="0" i="1" smtClean="0">
+                              <a:latin typeface="Cambria Math" panose="02040503050406030204" pitchFamily="18" charset="0"/>
+                            </a:rPr>
+                          </m:ctrlPr>
+                        </m:sSubPr>
+                        <m:e>
+                          <m:r>
+                            <a:rPr lang="en-US" sz="2200" b="0" i="1" smtClean="0">
+                              <a:latin typeface="Cambria Math" panose="02040503050406030204" pitchFamily="18" charset="0"/>
+                            </a:rPr>
+                            <m:t>𝑐</m:t>
+                          </m:r>
+                        </m:e>
+                        <m:sub>
+                          <m:r>
+                            <a:rPr lang="en-US" sz="2200" b="0" i="1" smtClean="0">
+                              <a:latin typeface="Cambria Math" panose="02040503050406030204" pitchFamily="18" charset="0"/>
+                            </a:rPr>
+                            <m:t>𝑡</m:t>
+                          </m:r>
+                        </m:sub>
+                      </m:sSub>
+                      <m:r>
+                        <a:rPr lang="en-US" sz="2200" b="0" i="1" smtClean="0">
+                          <a:latin typeface="Cambria Math" panose="02040503050406030204" pitchFamily="18" charset="0"/>
+                          <a:ea typeface="Cambria Math" panose="02040503050406030204" pitchFamily="18" charset="0"/>
+                        </a:rPr>
+                        <m:t>∆</m:t>
+                      </m:r>
+                      <m:r>
+                        <a:rPr lang="en-US" sz="2200" b="0" i="1" smtClean="0">
+                          <a:latin typeface="Cambria Math" panose="02040503050406030204" pitchFamily="18" charset="0"/>
+                          <a:ea typeface="Cambria Math" panose="02040503050406030204" pitchFamily="18" charset="0"/>
+                        </a:rPr>
+                        <m:t>𝑡</m:t>
+                      </m:r>
+                      <m:r>
+                        <a:rPr lang="en-US" sz="2200" b="0" i="1" smtClean="0">
+                          <a:latin typeface="Cambria Math" panose="02040503050406030204" pitchFamily="18" charset="0"/>
+                        </a:rPr>
+                        <m:t>−</m:t>
+                      </m:r>
+                      <m:sSub>
+                        <m:sSubPr>
+                          <m:ctrlPr>
+                            <a:rPr lang="en-US" sz="2200" b="0" i="1" smtClean="0">
+                              <a:latin typeface="Cambria Math" panose="02040503050406030204" pitchFamily="18" charset="0"/>
+                            </a:rPr>
+                          </m:ctrlPr>
+                        </m:sSubPr>
+                        <m:e>
+                          <m:r>
+                            <a:rPr lang="en-US" sz="2200" b="0" i="1" smtClean="0">
+                              <a:latin typeface="Cambria Math" panose="02040503050406030204" pitchFamily="18" charset="0"/>
+                              <a:ea typeface="Cambria Math" panose="02040503050406030204" pitchFamily="18" charset="0"/>
+                            </a:rPr>
+                            <m:t>𝛾</m:t>
+                          </m:r>
+                        </m:e>
+                        <m:sub>
+                          <m:r>
+                            <a:rPr lang="en-US" sz="2200" b="0" i="1" smtClean="0">
+                              <a:latin typeface="Cambria Math" panose="02040503050406030204" pitchFamily="18" charset="0"/>
+                            </a:rPr>
+                            <m:t>𝑑</m:t>
+                          </m:r>
+                        </m:sub>
+                      </m:sSub>
+                      <m:sSub>
+                        <m:sSubPr>
+                          <m:ctrlPr>
+                            <a:rPr lang="en-US" sz="2200" b="0" i="1" smtClean="0">
+                              <a:latin typeface="Cambria Math" panose="02040503050406030204" pitchFamily="18" charset="0"/>
+                            </a:rPr>
+                          </m:ctrlPr>
+                        </m:sSubPr>
+                        <m:e>
+                          <m:r>
+                            <a:rPr lang="en-US" sz="2200" b="0" i="1" smtClean="0">
+                              <a:latin typeface="Cambria Math" panose="02040503050406030204" pitchFamily="18" charset="0"/>
+                            </a:rPr>
+                            <m:t>𝑑</m:t>
+                          </m:r>
+                        </m:e>
+                        <m:sub>
+                          <m:r>
+                            <a:rPr lang="en-US" sz="2200" b="0" i="1" smtClean="0">
+                              <a:latin typeface="Cambria Math" panose="02040503050406030204" pitchFamily="18" charset="0"/>
+                            </a:rPr>
+                            <m:t>𝑡</m:t>
+                          </m:r>
+                        </m:sub>
+                      </m:sSub>
+                      <m:r>
+                        <a:rPr lang="en-US" sz="2200" i="1">
+                          <a:latin typeface="Cambria Math" panose="02040503050406030204" pitchFamily="18" charset="0"/>
+                          <a:ea typeface="Cambria Math" panose="02040503050406030204" pitchFamily="18" charset="0"/>
+                        </a:rPr>
+                        <m:t>∆</m:t>
+                      </m:r>
+                      <m:r>
+                        <a:rPr lang="en-US" sz="2200" i="1">
+                          <a:latin typeface="Cambria Math" panose="02040503050406030204" pitchFamily="18" charset="0"/>
+                          <a:ea typeface="Cambria Math" panose="02040503050406030204" pitchFamily="18" charset="0"/>
+                        </a:rPr>
+                        <m:t>𝑡</m:t>
+                      </m:r>
+                    </m:oMath>
+                  </m:oMathPara>
+                </a14:m>
+                <a:endParaRPr lang="en-US" sz="2200" b="0" dirty="0"/>
+              </a:p>
+              <a:p>
+                <a:pPr lvl="0"/>
+                <a:r>
+                  <a:rPr lang="en-US" sz="2200" dirty="0">
+                    <a:latin typeface="Calibri" panose="020F0502020204030204" pitchFamily="34" charset="0"/>
+                    <a:cs typeface="Calibri" panose="020F0502020204030204" pitchFamily="34" charset="0"/>
+                  </a:rPr>
+                  <a:t>Where </a:t>
+                </a:r>
+                <a:r>
+                  <a:rPr lang="en-US" sz="2200" i="1" dirty="0">
+                    <a:latin typeface="Calibri" panose="020F0502020204030204" pitchFamily="34" charset="0"/>
+                    <a:cs typeface="Calibri" panose="020F0502020204030204" pitchFamily="34" charset="0"/>
+                  </a:rPr>
+                  <a:t>Q</a:t>
+                </a:r>
+                <a:r>
+                  <a:rPr lang="en-US" sz="2200" dirty="0">
+                    <a:latin typeface="Calibri" panose="020F0502020204030204" pitchFamily="34" charset="0"/>
+                    <a:cs typeface="Calibri" panose="020F0502020204030204" pitchFamily="34" charset="0"/>
+                  </a:rPr>
+                  <a:t> is the state of charge, </a:t>
+                </a:r>
+                <a:r>
+                  <a:rPr lang="en-US" sz="2200" i="1" dirty="0">
+                    <a:latin typeface="Calibri" panose="020F0502020204030204" pitchFamily="34" charset="0"/>
+                    <a:cs typeface="Calibri" panose="020F0502020204030204" pitchFamily="34" charset="0"/>
+                  </a:rPr>
+                  <a:t>c</a:t>
+                </a:r>
+                <a:r>
+                  <a:rPr lang="en-US" sz="2200" dirty="0">
+                    <a:latin typeface="Calibri" panose="020F0502020204030204" pitchFamily="34" charset="0"/>
+                    <a:cs typeface="Calibri" panose="020F0502020204030204" pitchFamily="34" charset="0"/>
+                  </a:rPr>
+                  <a:t> is the charge rate, </a:t>
+                </a:r>
+                <a:r>
+                  <a:rPr lang="en-US" sz="2200" i="1" dirty="0">
+                    <a:latin typeface="Calibri" panose="020F0502020204030204" pitchFamily="34" charset="0"/>
+                    <a:cs typeface="Calibri" panose="020F0502020204030204" pitchFamily="34" charset="0"/>
+                  </a:rPr>
+                  <a:t>d</a:t>
+                </a:r>
+                <a:r>
+                  <a:rPr lang="en-US" sz="2200" dirty="0">
+                    <a:latin typeface="Calibri" panose="020F0502020204030204" pitchFamily="34" charset="0"/>
+                    <a:cs typeface="Calibri" panose="020F0502020204030204" pitchFamily="34" charset="0"/>
+                  </a:rPr>
+                  <a:t> is the discharge rate, </a:t>
+                </a:r>
+                <a:r>
+                  <a:rPr lang="el-GR" sz="2200" i="1" dirty="0">
+                    <a:latin typeface="Calibri" panose="020F0502020204030204" pitchFamily="34" charset="0"/>
+                    <a:cs typeface="Calibri" panose="020F0502020204030204" pitchFamily="34" charset="0"/>
+                  </a:rPr>
+                  <a:t>ϒ</a:t>
+                </a:r>
+                <a:r>
+                  <a:rPr lang="en-US" sz="2200" dirty="0">
+                    <a:latin typeface="Calibri" panose="020F0502020204030204" pitchFamily="34" charset="0"/>
+                    <a:cs typeface="Calibri" panose="020F0502020204030204" pitchFamily="34" charset="0"/>
+                  </a:rPr>
+                  <a:t> are the charge and discharge efficiencies, and </a:t>
+                </a:r>
+                <a:r>
+                  <a:rPr lang="el-GR" sz="2200" i="1" dirty="0">
+                    <a:latin typeface="Calibri" panose="020F0502020204030204" pitchFamily="34" charset="0"/>
+                    <a:cs typeface="Calibri" panose="020F0502020204030204" pitchFamily="34" charset="0"/>
+                  </a:rPr>
+                  <a:t>Δ</a:t>
+                </a:r>
+                <a:r>
+                  <a:rPr lang="en-US" sz="2200" i="1" dirty="0">
+                    <a:latin typeface="Calibri" panose="020F0502020204030204" pitchFamily="34" charset="0"/>
+                    <a:cs typeface="Calibri" panose="020F0502020204030204" pitchFamily="34" charset="0"/>
+                  </a:rPr>
+                  <a:t>t</a:t>
+                </a:r>
+                <a:r>
+                  <a:rPr lang="en-US" sz="2200" dirty="0">
+                    <a:latin typeface="Calibri" panose="020F0502020204030204" pitchFamily="34" charset="0"/>
+                    <a:cs typeface="Calibri" panose="020F0502020204030204" pitchFamily="34" charset="0"/>
+                  </a:rPr>
+                  <a:t> is the time step.</a:t>
+                </a:r>
+              </a:p>
+              <a:p>
+                <a:pPr lvl="0"/>
+                <a:endParaRPr lang="en-US" sz="2200" dirty="0">
+                  <a:latin typeface="Calibri" panose="020F0502020204030204" pitchFamily="34" charset="0"/>
+                  <a:cs typeface="Calibri" panose="020F0502020204030204" pitchFamily="34" charset="0"/>
+                </a:endParaRPr>
+              </a:p>
+              <a:p>
+                <a:pPr lvl="0"/>
+                <a:r>
+                  <a:rPr lang="en-US" sz="2200" dirty="0">
+                    <a:latin typeface="Calibri" panose="020F0502020204030204" pitchFamily="34" charset="0"/>
+                    <a:cs typeface="Calibri" panose="020F0502020204030204" pitchFamily="34" charset="0"/>
+                  </a:rPr>
+                  <a:t>In order to calculate the efficiencies, we use a pulse charge and discharge cycle, so that </a:t>
+                </a:r>
+                <a:r>
+                  <a:rPr lang="en-US" sz="2200" i="1" dirty="0">
+                    <a:latin typeface="Calibri" panose="020F0502020204030204" pitchFamily="34" charset="0"/>
+                    <a:cs typeface="Calibri" panose="020F0502020204030204" pitchFamily="34" charset="0"/>
+                  </a:rPr>
+                  <a:t>c</a:t>
+                </a:r>
+                <a:r>
+                  <a:rPr lang="en-US" sz="2200" dirty="0">
+                    <a:latin typeface="Calibri" panose="020F0502020204030204" pitchFamily="34" charset="0"/>
+                    <a:cs typeface="Calibri" panose="020F0502020204030204" pitchFamily="34" charset="0"/>
+                  </a:rPr>
+                  <a:t> and </a:t>
+                </a:r>
+                <a:r>
+                  <a:rPr lang="en-US" sz="2200" i="1" dirty="0">
+                    <a:latin typeface="Calibri" panose="020F0502020204030204" pitchFamily="34" charset="0"/>
+                    <a:cs typeface="Calibri" panose="020F0502020204030204" pitchFamily="34" charset="0"/>
+                  </a:rPr>
+                  <a:t>d</a:t>
+                </a:r>
+                <a:r>
+                  <a:rPr lang="en-US" sz="2200" dirty="0">
+                    <a:latin typeface="Calibri" panose="020F0502020204030204" pitchFamily="34" charset="0"/>
+                    <a:cs typeface="Calibri" panose="020F0502020204030204" pitchFamily="34" charset="0"/>
+                  </a:rPr>
+                  <a:t> are each constant for many time steps in a row.</a:t>
+                </a:r>
+              </a:p>
+              <a:p>
+                <a:pPr lvl="0"/>
+                <a:endParaRPr lang="en-US" sz="2200" dirty="0">
+                  <a:latin typeface="Calibri" panose="020F0502020204030204" pitchFamily="34" charset="0"/>
+                  <a:cs typeface="Calibri" panose="020F0502020204030204" pitchFamily="34" charset="0"/>
+                </a:endParaRPr>
+              </a:p>
+              <a:p>
+                <a:pPr lvl="0"/>
+                <a:r>
+                  <a:rPr lang="en-US" sz="2200" dirty="0">
+                    <a:latin typeface="Calibri" panose="020F0502020204030204" pitchFamily="34" charset="0"/>
+                    <a:cs typeface="Calibri" panose="020F0502020204030204" pitchFamily="34" charset="0"/>
+                  </a:rPr>
+                  <a:t>To evaluate the accuracy, we then use these efficiencies to predict the SOC with realistic charge and discharge cycles, and compare to the BDS results with the same cycles.</a:t>
+                </a:r>
+                <a:endParaRPr sz="2200" dirty="0">
+                  <a:latin typeface="Calibri" panose="020F0502020204030204" pitchFamily="34" charset="0"/>
+                  <a:cs typeface="Calibri" panose="020F0502020204030204" pitchFamily="34" charset="0"/>
+                </a:endParaRPr>
+              </a:p>
+            </p:txBody>
+          </p:sp>
+        </mc:Choice>
+        <mc:Fallback>
+          <p:sp>
+            <p:nvSpPr>
+              <p:cNvPr id="93" name="Google Shape;93;p1"/>
+              <p:cNvSpPr txBox="1">
+                <a:spLocks noRot="1" noChangeAspect="1" noMove="1" noResize="1" noEditPoints="1" noAdjustHandles="1" noChangeArrowheads="1" noChangeShapeType="1" noTextEdit="1"/>
+              </p:cNvSpPr>
+              <p:nvPr/>
+            </p:nvSpPr>
+            <p:spPr>
+              <a:xfrm>
+                <a:off x="1765400" y="12566163"/>
+                <a:ext cx="7670100" cy="7201931"/>
+              </a:xfrm>
+              <a:prstGeom prst="rect">
+                <a:avLst/>
+              </a:prstGeom>
+              <a:blipFill>
+                <a:blip r:embed="rId3"/>
+                <a:stretch>
+                  <a:fillRect l="-1033" t="-508" r="-397" b="-761"/>
+                </a:stretch>
+              </a:blipFill>
+              <a:ln>
+                <a:noFill/>
+              </a:ln>
+            </p:spPr>
+            <p:txBody>
+              <a:bodyPr/>
+              <a:lstStyle/>
+              <a:p>
+                <a:r>
+                  <a:rPr lang="en-US">
+                    <a:noFill/>
+                  </a:rPr>
+                  <a:t> </a:t>
+                </a:r>
+              </a:p>
+            </p:txBody>
+          </p:sp>
+        </mc:Fallback>
+      </mc:AlternateContent>
       <p:sp>
         <p:nvSpPr>
           <p:cNvPr id="94" name="Google Shape;94;p1"/>
@@ -12167,7 +12615,7 @@
         </p:nvSpPr>
         <p:spPr>
           <a:xfrm>
-            <a:off x="1838970" y="14601948"/>
+            <a:off x="1835725" y="20387413"/>
             <a:ext cx="7670100" cy="430847"/>
           </a:xfrm>
           <a:prstGeom prst="rect">

</xml_diff>

<commit_message>
Results added (only for eff found at 1A)
</commit_message>
<xml_diff>
--- a/Project Poster.pptx
+++ b/Project Poster.pptx
@@ -246,7 +246,7 @@
       <p15:sldGuideLst xmlns:p15="http://schemas.microsoft.com/office/powerpoint/2012/main"/>
     </p:ext>
     <p:ext uri="http://customooxmlschemas.google.com/">
-      <go:slidesCustomData xmlns="" xmlns:mc="http://schemas.openxmlformats.org/markup-compatibility/2006" xmlns:mv="urn:schemas-microsoft-com:mac:vml" xmlns:c="http://schemas.openxmlformats.org/drawingml/2006/chart" xmlns:dgm="http://schemas.openxmlformats.org/drawingml/2006/diagram" xmlns:o="urn:schemas-microsoft-com:office:office" xmlns:v="urn:schemas-microsoft-com:vml" xmlns:pvml="urn:schemas-microsoft-com:office:powerpoint" xmlns:com="http://schemas.openxmlformats.org/drawingml/2006/compatibility" xmlns:p14="http://schemas.microsoft.com/office/powerpoint/2010/main" xmlns:p15="http://schemas.microsoft.com/office/powerpoint/2012/main" xmlns:go="http://customooxmlschemas.google.com/" r:id="rId7" roundtripDataSignature="AMtx7mia2HK9xto4cWUpRqy9HTZm6ngvMQ=="/>
+      <go:slidesCustomData xmlns:go="http://customooxmlschemas.google.com/" xmlns:p15="http://schemas.microsoft.com/office/powerpoint/2012/main" xmlns:p14="http://schemas.microsoft.com/office/powerpoint/2010/main" xmlns:com="http://schemas.openxmlformats.org/drawingml/2006/compatibility" xmlns:pvml="urn:schemas-microsoft-com:office:powerpoint" xmlns:v="urn:schemas-microsoft-com:vml" xmlns:o="urn:schemas-microsoft-com:office:office" xmlns:dgm="http://schemas.openxmlformats.org/drawingml/2006/diagram" xmlns:c="http://schemas.openxmlformats.org/drawingml/2006/chart" xmlns:mv="urn:schemas-microsoft-com:mac:vml" xmlns:mc="http://schemas.openxmlformats.org/markup-compatibility/2006" xmlns="" r:id="rId7" roundtripDataSignature="AMtx7mia2HK9xto4cWUpRqy9HTZm6ngvMQ=="/>
     </p:ext>
   </p:extLst>
 </p:presentation>
@@ -11040,7 +11040,7 @@
                     <a:cs typeface="Calibri"/>
                     <a:sym typeface="Calibri"/>
                   </a:rPr>
-                  <a:t>As a “ground truth” we use the simulation results of the BDS (battery design studio) default NiMH cell ECM. We then compare the results of this to the results using a simple mathematical model for efficiency:</a:t>
+                  <a:t>As a “ground truth” we use the simulation results of the BDS (battery design studio) default NiMH cell ECM. We then compare the results of this to the results using a simple mathematical model for SOC with constant efficiency:</a:t>
                 </a:r>
               </a:p>
               <a:p>
@@ -11672,266 +11672,6 @@
       </p:sp>
       <p:sp>
         <p:nvSpPr>
-          <p:cNvPr id="104" name="Google Shape;104;p1"/>
-          <p:cNvSpPr txBox="1"/>
-          <p:nvPr/>
-        </p:nvSpPr>
-        <p:spPr>
-          <a:xfrm>
-            <a:off x="11327400" y="20387413"/>
-            <a:ext cx="10568400" cy="589500"/>
-          </a:xfrm>
-          <a:prstGeom prst="rect">
-            <a:avLst/>
-          </a:prstGeom>
-          <a:noFill/>
-          <a:ln>
-            <a:noFill/>
-          </a:ln>
-        </p:spPr>
-        <p:txBody>
-          <a:bodyPr spcFirstLastPara="1" wrap="square" lIns="91425" tIns="45700" rIns="91425" bIns="45700" anchor="t" anchorCtr="0">
-            <a:noAutofit/>
-          </a:bodyPr>
-          <a:lstStyle/>
-          <a:p>
-            <a:pPr marL="0" marR="0" lvl="0" indent="0" algn="ctr" rtl="0">
-              <a:spcBef>
-                <a:spcPts val="0"/>
-              </a:spcBef>
-              <a:spcAft>
-                <a:spcPts val="0"/>
-              </a:spcAft>
-              <a:buNone/>
-            </a:pPr>
-            <a:r>
-              <a:rPr lang="en-US" sz="1800" dirty="0">
-                <a:solidFill>
-                  <a:schemeClr val="dk1"/>
-                </a:solidFill>
-                <a:latin typeface="Calibri"/>
-                <a:ea typeface="Calibri"/>
-                <a:cs typeface="Calibri"/>
-                <a:sym typeface="Calibri"/>
-              </a:rPr>
-              <a:t>Figure: caption.</a:t>
-            </a:r>
-            <a:endParaRPr sz="1800" dirty="0"/>
-          </a:p>
-        </p:txBody>
-      </p:sp>
-      <p:sp>
-        <p:nvSpPr>
-          <p:cNvPr id="105" name="Google Shape;105;p1"/>
-          <p:cNvSpPr/>
-          <p:nvPr/>
-        </p:nvSpPr>
-        <p:spPr>
-          <a:xfrm>
-            <a:off x="11089575" y="15806225"/>
-            <a:ext cx="11044200" cy="4506600"/>
-          </a:xfrm>
-          <a:prstGeom prst="rect">
-            <a:avLst/>
-          </a:prstGeom>
-          <a:noFill/>
-          <a:ln w="38100" cap="flat" cmpd="sng">
-            <a:solidFill>
-              <a:srgbClr val="DD7E6B"/>
-            </a:solidFill>
-            <a:prstDash val="solid"/>
-            <a:round/>
-            <a:headEnd type="none" w="sm" len="sm"/>
-            <a:tailEnd type="none" w="sm" len="sm"/>
-          </a:ln>
-        </p:spPr>
-        <p:txBody>
-          <a:bodyPr spcFirstLastPara="1" wrap="square" lIns="91425" tIns="91425" rIns="91425" bIns="91425" anchor="ctr" anchorCtr="0">
-            <a:noAutofit/>
-          </a:bodyPr>
-          <a:lstStyle/>
-          <a:p>
-            <a:pPr marL="0" lvl="0" indent="0" algn="l" rtl="0">
-              <a:spcBef>
-                <a:spcPts val="0"/>
-              </a:spcBef>
-              <a:spcAft>
-                <a:spcPts val="0"/>
-              </a:spcAft>
-              <a:buNone/>
-            </a:pPr>
-            <a:endParaRPr/>
-          </a:p>
-        </p:txBody>
-      </p:sp>
-      <p:sp>
-        <p:nvSpPr>
-          <p:cNvPr id="106" name="Google Shape;106;p1"/>
-          <p:cNvSpPr txBox="1"/>
-          <p:nvPr/>
-        </p:nvSpPr>
-        <p:spPr>
-          <a:xfrm>
-            <a:off x="11122275" y="5056050"/>
-            <a:ext cx="10985100" cy="1517100"/>
-          </a:xfrm>
-          <a:prstGeom prst="rect">
-            <a:avLst/>
-          </a:prstGeom>
-          <a:noFill/>
-          <a:ln>
-            <a:noFill/>
-          </a:ln>
-        </p:spPr>
-        <p:txBody>
-          <a:bodyPr spcFirstLastPara="1" wrap="square" lIns="91425" tIns="45700" rIns="91425" bIns="45700" anchor="t" anchorCtr="0">
-            <a:noAutofit/>
-          </a:bodyPr>
-          <a:lstStyle/>
-          <a:p>
-            <a:pPr lvl="0" algn="just"/>
-            <a:r>
-              <a:rPr lang="en-US" sz="2200" b="1" dirty="0">
-                <a:solidFill>
-                  <a:schemeClr val="dk1"/>
-                </a:solidFill>
-                <a:latin typeface="Calibri"/>
-                <a:ea typeface="Calibri"/>
-                <a:cs typeface="Calibri"/>
-                <a:sym typeface="Calibri"/>
-              </a:rPr>
-              <a:t>Describe experiments</a:t>
-            </a:r>
-          </a:p>
-          <a:p>
-            <a:pPr lvl="0" algn="just"/>
-            <a:r>
-              <a:rPr lang="en-US" sz="2200" b="1" dirty="0">
-                <a:solidFill>
-                  <a:schemeClr val="dk1"/>
-                </a:solidFill>
-                <a:latin typeface="Calibri"/>
-                <a:ea typeface="Calibri"/>
-                <a:cs typeface="Calibri"/>
-                <a:sym typeface="Calibri"/>
-              </a:rPr>
-              <a:t>Identify each key takeaway and illustrate with results</a:t>
-            </a:r>
-          </a:p>
-          <a:p>
-            <a:pPr lvl="0" algn="just"/>
-            <a:r>
-              <a:rPr lang="en-US" sz="2200" b="1" dirty="0">
-                <a:solidFill>
-                  <a:schemeClr val="dk1"/>
-                </a:solidFill>
-                <a:latin typeface="Calibri"/>
-                <a:ea typeface="Calibri"/>
-                <a:cs typeface="Calibri"/>
-                <a:sym typeface="Calibri"/>
-              </a:rPr>
-              <a:t>Ideally each result has an accompanying figure or plot</a:t>
-            </a:r>
-            <a:endParaRPr sz="2200" b="1" dirty="0"/>
-          </a:p>
-        </p:txBody>
-      </p:sp>
-      <p:sp>
-        <p:nvSpPr>
-          <p:cNvPr id="109" name="Google Shape;109;p1"/>
-          <p:cNvSpPr/>
-          <p:nvPr/>
-        </p:nvSpPr>
-        <p:spPr>
-          <a:xfrm>
-            <a:off x="11089500" y="8563575"/>
-            <a:ext cx="11044200" cy="4506600"/>
-          </a:xfrm>
-          <a:prstGeom prst="rect">
-            <a:avLst/>
-          </a:prstGeom>
-          <a:noFill/>
-          <a:ln w="38100" cap="flat" cmpd="sng">
-            <a:solidFill>
-              <a:srgbClr val="DD7E6B"/>
-            </a:solidFill>
-            <a:prstDash val="solid"/>
-            <a:round/>
-            <a:headEnd type="none" w="sm" len="sm"/>
-            <a:tailEnd type="none" w="sm" len="sm"/>
-          </a:ln>
-        </p:spPr>
-        <p:txBody>
-          <a:bodyPr spcFirstLastPara="1" wrap="square" lIns="91425" tIns="91425" rIns="91425" bIns="91425" anchor="ctr" anchorCtr="0">
-            <a:noAutofit/>
-          </a:bodyPr>
-          <a:lstStyle/>
-          <a:p>
-            <a:pPr marL="0" lvl="0" indent="0" algn="l" rtl="0">
-              <a:spcBef>
-                <a:spcPts val="0"/>
-              </a:spcBef>
-              <a:spcAft>
-                <a:spcPts val="0"/>
-              </a:spcAft>
-              <a:buNone/>
-            </a:pPr>
-            <a:endParaRPr/>
-          </a:p>
-        </p:txBody>
-      </p:sp>
-      <p:sp>
-        <p:nvSpPr>
-          <p:cNvPr id="110" name="Google Shape;110;p1"/>
-          <p:cNvSpPr txBox="1"/>
-          <p:nvPr/>
-        </p:nvSpPr>
-        <p:spPr>
-          <a:xfrm>
-            <a:off x="11251200" y="13148413"/>
-            <a:ext cx="10568400" cy="589500"/>
-          </a:xfrm>
-          <a:prstGeom prst="rect">
-            <a:avLst/>
-          </a:prstGeom>
-          <a:noFill/>
-          <a:ln>
-            <a:noFill/>
-          </a:ln>
-        </p:spPr>
-        <p:txBody>
-          <a:bodyPr spcFirstLastPara="1" wrap="square" lIns="91425" tIns="45700" rIns="91425" bIns="45700" anchor="t" anchorCtr="0">
-            <a:noAutofit/>
-          </a:bodyPr>
-          <a:lstStyle/>
-          <a:p>
-            <a:pPr marL="0" marR="0" lvl="0" indent="0" algn="ctr" rtl="0">
-              <a:spcBef>
-                <a:spcPts val="0"/>
-              </a:spcBef>
-              <a:spcAft>
-                <a:spcPts val="0"/>
-              </a:spcAft>
-              <a:buNone/>
-            </a:pPr>
-            <a:r>
-              <a:rPr lang="en-US" sz="1800" dirty="0">
-                <a:solidFill>
-                  <a:schemeClr val="dk1"/>
-                </a:solidFill>
-                <a:latin typeface="Calibri"/>
-                <a:ea typeface="Calibri"/>
-                <a:cs typeface="Calibri"/>
-                <a:sym typeface="Calibri"/>
-              </a:rPr>
-              <a:t>Figure: caption.</a:t>
-            </a:r>
-            <a:endParaRPr sz="1800" dirty="0"/>
-          </a:p>
-        </p:txBody>
-      </p:sp>
-      <p:sp>
-        <p:nvSpPr>
           <p:cNvPr id="115" name="Google Shape;115;p1"/>
           <p:cNvSpPr txBox="1"/>
           <p:nvPr/>
@@ -12649,6 +12389,649 @@
           </a:p>
         </p:txBody>
       </p:sp>
+      <p:sp>
+        <p:nvSpPr>
+          <p:cNvPr id="24" name="Google Shape;106;p1">
+            <a:extLst>
+              <a:ext uri="{FF2B5EF4-FFF2-40B4-BE49-F238E27FC236}">
+                <a16:creationId xmlns:a16="http://schemas.microsoft.com/office/drawing/2014/main" id="{B663533A-093C-41C3-9D37-4C08A44E1E87}"/>
+              </a:ext>
+            </a:extLst>
+          </p:cNvPr>
+          <p:cNvSpPr txBox="1"/>
+          <p:nvPr/>
+        </p:nvSpPr>
+        <p:spPr>
+          <a:xfrm>
+            <a:off x="11148650" y="5163450"/>
+            <a:ext cx="10985100" cy="536244"/>
+          </a:xfrm>
+          <a:prstGeom prst="rect">
+            <a:avLst/>
+          </a:prstGeom>
+          <a:noFill/>
+          <a:ln>
+            <a:noFill/>
+          </a:ln>
+        </p:spPr>
+        <p:txBody>
+          <a:bodyPr spcFirstLastPara="1" wrap="square" lIns="91425" tIns="45700" rIns="91425" bIns="45700" anchor="t" anchorCtr="0">
+            <a:noAutofit/>
+          </a:bodyPr>
+          <a:lstStyle/>
+          <a:p>
+            <a:pPr lvl="0" algn="just"/>
+            <a:r>
+              <a:rPr lang="en-US" sz="2200" b="1" dirty="0">
+                <a:solidFill>
+                  <a:schemeClr val="dk1"/>
+                </a:solidFill>
+                <a:latin typeface="Calibri"/>
+                <a:ea typeface="Calibri"/>
+                <a:cs typeface="Calibri"/>
+                <a:sym typeface="Calibri"/>
+              </a:rPr>
+              <a:t>Calculating efficiency terms</a:t>
+            </a:r>
+            <a:endParaRPr sz="2200" b="1" dirty="0"/>
+          </a:p>
+        </p:txBody>
+      </p:sp>
+      <p:pic>
+        <p:nvPicPr>
+          <p:cNvPr id="1028" name="Picture 4">
+            <a:extLst>
+              <a:ext uri="{FF2B5EF4-FFF2-40B4-BE49-F238E27FC236}">
+                <a16:creationId xmlns:a16="http://schemas.microsoft.com/office/drawing/2014/main" id="{279F986A-FA9C-4D6C-88EF-92FDE837CC27}"/>
+              </a:ext>
+            </a:extLst>
+          </p:cNvPr>
+          <p:cNvPicPr>
+            <a:picLocks noChangeAspect="1" noChangeArrowheads="1"/>
+          </p:cNvPicPr>
+          <p:nvPr/>
+        </p:nvPicPr>
+        <p:blipFill>
+          <a:blip r:embed="rId4">
+            <a:extLst>
+              <a:ext uri="{28A0092B-C50C-407E-A947-70E740481C1C}">
+                <a14:useLocalDpi xmlns:a14="http://schemas.microsoft.com/office/drawing/2010/main" val="0"/>
+              </a:ext>
+            </a:extLst>
+          </a:blip>
+          <a:srcRect/>
+          <a:stretch>
+            <a:fillRect/>
+          </a:stretch>
+        </p:blipFill>
+        <p:spPr bwMode="auto">
+          <a:xfrm>
+            <a:off x="11327401" y="5765319"/>
+            <a:ext cx="5131800" cy="2623468"/>
+          </a:xfrm>
+          <a:prstGeom prst="rect">
+            <a:avLst/>
+          </a:prstGeom>
+          <a:noFill/>
+          <a:extLst>
+            <a:ext uri="{909E8E84-426E-40DD-AFC4-6F175D3DCCD1}">
+              <a14:hiddenFill xmlns:a14="http://schemas.microsoft.com/office/drawing/2010/main">
+                <a:solidFill>
+                  <a:srgbClr val="FFFFFF"/>
+                </a:solidFill>
+              </a14:hiddenFill>
+            </a:ext>
+          </a:extLst>
+        </p:spPr>
+      </p:pic>
+      <p:sp>
+        <p:nvSpPr>
+          <p:cNvPr id="27" name="Google Shape;106;p1">
+            <a:extLst>
+              <a:ext uri="{FF2B5EF4-FFF2-40B4-BE49-F238E27FC236}">
+                <a16:creationId xmlns:a16="http://schemas.microsoft.com/office/drawing/2014/main" id="{B65BB9C4-7CC0-4D18-8AA2-56406AF38BBA}"/>
+              </a:ext>
+            </a:extLst>
+          </p:cNvPr>
+          <p:cNvSpPr txBox="1"/>
+          <p:nvPr/>
+        </p:nvSpPr>
+        <p:spPr>
+          <a:xfrm>
+            <a:off x="16809246" y="5699694"/>
+            <a:ext cx="5543579" cy="2952240"/>
+          </a:xfrm>
+          <a:prstGeom prst="rect">
+            <a:avLst/>
+          </a:prstGeom>
+          <a:noFill/>
+          <a:ln>
+            <a:noFill/>
+          </a:ln>
+        </p:spPr>
+        <p:txBody>
+          <a:bodyPr spcFirstLastPara="1" wrap="square" lIns="91425" tIns="45700" rIns="91425" bIns="45700" anchor="t" anchorCtr="0">
+            <a:noAutofit/>
+          </a:bodyPr>
+          <a:lstStyle/>
+          <a:p>
+            <a:pPr lvl="0" algn="just"/>
+            <a:r>
+              <a:rPr lang="en-US" sz="2200" dirty="0">
+                <a:solidFill>
+                  <a:schemeClr val="dk1"/>
+                </a:solidFill>
+                <a:latin typeface="Calibri"/>
+                <a:ea typeface="Calibri"/>
+                <a:cs typeface="Calibri"/>
+                <a:sym typeface="Calibri"/>
+              </a:rPr>
+              <a:t>Input cycle: </a:t>
+            </a:r>
+          </a:p>
+          <a:p>
+            <a:pPr lvl="0" algn="just"/>
+            <a:r>
+              <a:rPr lang="en-US" sz="2200" dirty="0">
+                <a:solidFill>
+                  <a:schemeClr val="dk1"/>
+                </a:solidFill>
+                <a:latin typeface="Calibri"/>
+                <a:ea typeface="Calibri"/>
+                <a:cs typeface="Calibri"/>
+                <a:sym typeface="Calibri"/>
+              </a:rPr>
+              <a:t>1A charge and discharge rates at 1 hour each</a:t>
+            </a:r>
+          </a:p>
+          <a:p>
+            <a:pPr lvl="0" algn="just"/>
+            <a:endParaRPr lang="en-US" sz="2200" dirty="0">
+              <a:solidFill>
+                <a:schemeClr val="dk1"/>
+              </a:solidFill>
+              <a:latin typeface="Calibri"/>
+              <a:ea typeface="Calibri"/>
+              <a:cs typeface="Calibri"/>
+              <a:sym typeface="Calibri"/>
+            </a:endParaRPr>
+          </a:p>
+          <a:p>
+            <a:pPr lvl="0" algn="just"/>
+            <a:r>
+              <a:rPr lang="en-US" sz="2200" dirty="0">
+                <a:solidFill>
+                  <a:schemeClr val="dk1"/>
+                </a:solidFill>
+                <a:latin typeface="Calibri"/>
+                <a:ea typeface="Calibri"/>
+                <a:cs typeface="Calibri"/>
+                <a:sym typeface="Calibri"/>
+              </a:rPr>
+              <a:t>Results:</a:t>
+            </a:r>
+          </a:p>
+          <a:p>
+            <a:pPr lvl="0" algn="just"/>
+            <a:r>
+              <a:rPr lang="en-US" sz="2200" dirty="0">
+                <a:solidFill>
+                  <a:schemeClr val="dk1"/>
+                </a:solidFill>
+                <a:latin typeface="Calibri"/>
+                <a:ea typeface="Calibri"/>
+                <a:cs typeface="Calibri"/>
+                <a:sym typeface="Calibri"/>
+              </a:rPr>
+              <a:t>Charge efficiency: 0.9889</a:t>
+            </a:r>
+          </a:p>
+          <a:p>
+            <a:pPr lvl="0" algn="just"/>
+            <a:r>
+              <a:rPr lang="en-US" sz="2200" dirty="0">
+                <a:solidFill>
+                  <a:schemeClr val="dk1"/>
+                </a:solidFill>
+                <a:latin typeface="Calibri"/>
+                <a:ea typeface="Calibri"/>
+                <a:cs typeface="Calibri"/>
+                <a:sym typeface="Calibri"/>
+              </a:rPr>
+              <a:t>Discharge efficiency: 0.9988 </a:t>
+            </a:r>
+          </a:p>
+          <a:p>
+            <a:pPr lvl="0" algn="just"/>
+            <a:r>
+              <a:rPr lang="en-US" sz="2200" dirty="0">
+                <a:solidFill>
+                  <a:schemeClr val="dk1"/>
+                </a:solidFill>
+                <a:latin typeface="Calibri"/>
+                <a:ea typeface="Calibri"/>
+                <a:cs typeface="Calibri"/>
+                <a:sym typeface="Calibri"/>
+              </a:rPr>
+              <a:t>(or 1.001178 in SOC equation)</a:t>
+            </a:r>
+          </a:p>
+        </p:txBody>
+      </p:sp>
+      <p:sp>
+        <p:nvSpPr>
+          <p:cNvPr id="28" name="Google Shape;106;p1">
+            <a:extLst>
+              <a:ext uri="{FF2B5EF4-FFF2-40B4-BE49-F238E27FC236}">
+                <a16:creationId xmlns:a16="http://schemas.microsoft.com/office/drawing/2014/main" id="{1BC803BD-779D-4EBC-9186-029A4C22B094}"/>
+              </a:ext>
+            </a:extLst>
+          </p:cNvPr>
+          <p:cNvSpPr txBox="1"/>
+          <p:nvPr/>
+        </p:nvSpPr>
+        <p:spPr>
+          <a:xfrm>
+            <a:off x="11148650" y="8660382"/>
+            <a:ext cx="10985100" cy="536244"/>
+          </a:xfrm>
+          <a:prstGeom prst="rect">
+            <a:avLst/>
+          </a:prstGeom>
+          <a:noFill/>
+          <a:ln>
+            <a:noFill/>
+          </a:ln>
+        </p:spPr>
+        <p:txBody>
+          <a:bodyPr spcFirstLastPara="1" wrap="square" lIns="91425" tIns="45700" rIns="91425" bIns="45700" anchor="t" anchorCtr="0">
+            <a:noAutofit/>
+          </a:bodyPr>
+          <a:lstStyle/>
+          <a:p>
+            <a:pPr lvl="0" algn="just"/>
+            <a:r>
+              <a:rPr lang="en-US" sz="2200" b="1" dirty="0">
+                <a:solidFill>
+                  <a:schemeClr val="dk1"/>
+                </a:solidFill>
+                <a:latin typeface="Calibri"/>
+                <a:ea typeface="Calibri"/>
+                <a:cs typeface="Calibri"/>
+                <a:sym typeface="Calibri"/>
+              </a:rPr>
+              <a:t>Evaluating accuracy: compare BDS to linear efficiency SOC prediction</a:t>
+            </a:r>
+            <a:endParaRPr sz="2200" b="1" dirty="0"/>
+          </a:p>
+        </p:txBody>
+      </p:sp>
+      <p:sp>
+        <p:nvSpPr>
+          <p:cNvPr id="31" name="Google Shape;106;p1">
+            <a:extLst>
+              <a:ext uri="{FF2B5EF4-FFF2-40B4-BE49-F238E27FC236}">
+                <a16:creationId xmlns:a16="http://schemas.microsoft.com/office/drawing/2014/main" id="{8E75B4E0-2776-4C4F-8181-7906112A815C}"/>
+              </a:ext>
+            </a:extLst>
+          </p:cNvPr>
+          <p:cNvSpPr txBox="1"/>
+          <p:nvPr/>
+        </p:nvSpPr>
+        <p:spPr>
+          <a:xfrm>
+            <a:off x="11128688" y="12420256"/>
+            <a:ext cx="10958724" cy="926339"/>
+          </a:xfrm>
+          <a:prstGeom prst="rect">
+            <a:avLst/>
+          </a:prstGeom>
+          <a:noFill/>
+          <a:ln>
+            <a:noFill/>
+          </a:ln>
+        </p:spPr>
+        <p:txBody>
+          <a:bodyPr spcFirstLastPara="1" wrap="square" lIns="91425" tIns="45700" rIns="91425" bIns="45700" anchor="t" anchorCtr="0">
+            <a:noAutofit/>
+          </a:bodyPr>
+          <a:lstStyle/>
+          <a:p>
+            <a:pPr lvl="0" algn="just"/>
+            <a:r>
+              <a:rPr lang="en-US" sz="2200" dirty="0">
+                <a:solidFill>
+                  <a:schemeClr val="dk1"/>
+                </a:solidFill>
+                <a:latin typeface="Calibri"/>
+                <a:ea typeface="Calibri"/>
+                <a:cs typeface="Calibri"/>
+                <a:sym typeface="Calibri"/>
+              </a:rPr>
+              <a:t>Input cycle: daily peak shifting </a:t>
+            </a:r>
+          </a:p>
+          <a:p>
+            <a:pPr lvl="0" algn="just"/>
+            <a:r>
+              <a:rPr lang="en-US" sz="2200" dirty="0">
+                <a:solidFill>
+                  <a:schemeClr val="dk1"/>
+                </a:solidFill>
+                <a:latin typeface="Calibri"/>
+                <a:ea typeface="Calibri"/>
+                <a:cs typeface="Calibri"/>
+                <a:sym typeface="Calibri"/>
+              </a:rPr>
+              <a:t>Results: Max residual 0.078% SOC, final residual 0.055% SOC</a:t>
+            </a:r>
+          </a:p>
+        </p:txBody>
+      </p:sp>
+      <p:pic>
+        <p:nvPicPr>
+          <p:cNvPr id="2" name="Picture 1">
+            <a:extLst>
+              <a:ext uri="{FF2B5EF4-FFF2-40B4-BE49-F238E27FC236}">
+                <a16:creationId xmlns:a16="http://schemas.microsoft.com/office/drawing/2014/main" id="{A16DEF6A-3AE7-4F3A-BE41-F34C3DDD971D}"/>
+              </a:ext>
+            </a:extLst>
+          </p:cNvPr>
+          <p:cNvPicPr>
+            <a:picLocks noChangeAspect="1"/>
+          </p:cNvPicPr>
+          <p:nvPr/>
+        </p:nvPicPr>
+        <p:blipFill>
+          <a:blip r:embed="rId5"/>
+          <a:stretch>
+            <a:fillRect/>
+          </a:stretch>
+        </p:blipFill>
+        <p:spPr>
+          <a:xfrm>
+            <a:off x="10993977" y="9286924"/>
+            <a:ext cx="5582180" cy="3175416"/>
+          </a:xfrm>
+          <a:prstGeom prst="rect">
+            <a:avLst/>
+          </a:prstGeom>
+        </p:spPr>
+      </p:pic>
+      <p:pic>
+        <p:nvPicPr>
+          <p:cNvPr id="3" name="Picture 2">
+            <a:extLst>
+              <a:ext uri="{FF2B5EF4-FFF2-40B4-BE49-F238E27FC236}">
+                <a16:creationId xmlns:a16="http://schemas.microsoft.com/office/drawing/2014/main" id="{60887439-E599-4903-A2C5-D5852C83121E}"/>
+              </a:ext>
+            </a:extLst>
+          </p:cNvPr>
+          <p:cNvPicPr>
+            <a:picLocks noChangeAspect="1"/>
+          </p:cNvPicPr>
+          <p:nvPr/>
+        </p:nvPicPr>
+        <p:blipFill>
+          <a:blip r:embed="rId6"/>
+          <a:stretch>
+            <a:fillRect/>
+          </a:stretch>
+        </p:blipFill>
+        <p:spPr>
+          <a:xfrm>
+            <a:off x="16277642" y="9284066"/>
+            <a:ext cx="5638476" cy="3168764"/>
+          </a:xfrm>
+          <a:prstGeom prst="rect">
+            <a:avLst/>
+          </a:prstGeom>
+        </p:spPr>
+      </p:pic>
+      <p:sp>
+        <p:nvSpPr>
+          <p:cNvPr id="34" name="Google Shape;106;p1">
+            <a:extLst>
+              <a:ext uri="{FF2B5EF4-FFF2-40B4-BE49-F238E27FC236}">
+                <a16:creationId xmlns:a16="http://schemas.microsoft.com/office/drawing/2014/main" id="{17DEAA5F-8A08-45F2-9C42-173E09B446C9}"/>
+              </a:ext>
+            </a:extLst>
+          </p:cNvPr>
+          <p:cNvSpPr txBox="1"/>
+          <p:nvPr/>
+        </p:nvSpPr>
+        <p:spPr>
+          <a:xfrm>
+            <a:off x="11096795" y="16266921"/>
+            <a:ext cx="10958724" cy="926339"/>
+          </a:xfrm>
+          <a:prstGeom prst="rect">
+            <a:avLst/>
+          </a:prstGeom>
+          <a:noFill/>
+          <a:ln>
+            <a:noFill/>
+          </a:ln>
+        </p:spPr>
+        <p:txBody>
+          <a:bodyPr spcFirstLastPara="1" wrap="square" lIns="91425" tIns="45700" rIns="91425" bIns="45700" anchor="t" anchorCtr="0">
+            <a:noAutofit/>
+          </a:bodyPr>
+          <a:lstStyle/>
+          <a:p>
+            <a:pPr lvl="0" algn="just"/>
+            <a:r>
+              <a:rPr lang="en-US" sz="2200" dirty="0">
+                <a:solidFill>
+                  <a:schemeClr val="dk1"/>
+                </a:solidFill>
+                <a:latin typeface="Calibri"/>
+                <a:ea typeface="Calibri"/>
+                <a:cs typeface="Calibri"/>
+                <a:sym typeface="Calibri"/>
+              </a:rPr>
+              <a:t>Input cycle: regulation D signal</a:t>
+            </a:r>
+          </a:p>
+          <a:p>
+            <a:pPr lvl="0" algn="just"/>
+            <a:r>
+              <a:rPr lang="en-US" sz="2200" dirty="0">
+                <a:solidFill>
+                  <a:schemeClr val="dk1"/>
+                </a:solidFill>
+                <a:latin typeface="Calibri"/>
+                <a:ea typeface="Calibri"/>
+                <a:cs typeface="Calibri"/>
+                <a:sym typeface="Calibri"/>
+              </a:rPr>
+              <a:t>Results: Max residual -0.16% SOC, final residual -0.065% SOC</a:t>
+            </a:r>
+          </a:p>
+        </p:txBody>
+      </p:sp>
+      <p:pic>
+        <p:nvPicPr>
+          <p:cNvPr id="5" name="Picture 4" descr="A group of people on a map&#10;&#10;Description automatically generated">
+            <a:extLst>
+              <a:ext uri="{FF2B5EF4-FFF2-40B4-BE49-F238E27FC236}">
+                <a16:creationId xmlns:a16="http://schemas.microsoft.com/office/drawing/2014/main" id="{DE29D0FC-9CF8-47C0-885F-5C0B88B7FCB8}"/>
+              </a:ext>
+            </a:extLst>
+          </p:cNvPr>
+          <p:cNvPicPr>
+            <a:picLocks noChangeAspect="1"/>
+          </p:cNvPicPr>
+          <p:nvPr/>
+        </p:nvPicPr>
+        <p:blipFill>
+          <a:blip r:embed="rId7"/>
+          <a:stretch>
+            <a:fillRect/>
+          </a:stretch>
+        </p:blipFill>
+        <p:spPr>
+          <a:xfrm>
+            <a:off x="16368758" y="13298323"/>
+            <a:ext cx="5547360" cy="2991192"/>
+          </a:xfrm>
+          <a:prstGeom prst="rect">
+            <a:avLst/>
+          </a:prstGeom>
+        </p:spPr>
+      </p:pic>
+      <p:pic>
+        <p:nvPicPr>
+          <p:cNvPr id="7" name="Picture 6" descr="A group of people on a map&#10;&#10;Description automatically generated">
+            <a:extLst>
+              <a:ext uri="{FF2B5EF4-FFF2-40B4-BE49-F238E27FC236}">
+                <a16:creationId xmlns:a16="http://schemas.microsoft.com/office/drawing/2014/main" id="{5383F4BC-80CE-463E-9A31-05A056BA8505}"/>
+              </a:ext>
+            </a:extLst>
+          </p:cNvPr>
+          <p:cNvPicPr>
+            <a:picLocks noChangeAspect="1"/>
+          </p:cNvPicPr>
+          <p:nvPr/>
+        </p:nvPicPr>
+        <p:blipFill>
+          <a:blip r:embed="rId8"/>
+          <a:stretch>
+            <a:fillRect/>
+          </a:stretch>
+        </p:blipFill>
+        <p:spPr>
+          <a:xfrm>
+            <a:off x="10993977" y="13303359"/>
+            <a:ext cx="5465922" cy="2981121"/>
+          </a:xfrm>
+          <a:prstGeom prst="rect">
+            <a:avLst/>
+          </a:prstGeom>
+        </p:spPr>
+      </p:pic>
+      <p:sp>
+        <p:nvSpPr>
+          <p:cNvPr id="41" name="Google Shape;106;p1">
+            <a:extLst>
+              <a:ext uri="{FF2B5EF4-FFF2-40B4-BE49-F238E27FC236}">
+                <a16:creationId xmlns:a16="http://schemas.microsoft.com/office/drawing/2014/main" id="{702F42DD-8732-41FA-BC40-B18F7B8852E8}"/>
+              </a:ext>
+            </a:extLst>
+          </p:cNvPr>
+          <p:cNvSpPr txBox="1"/>
+          <p:nvPr/>
+        </p:nvSpPr>
+        <p:spPr>
+          <a:xfrm>
+            <a:off x="11128688" y="20179050"/>
+            <a:ext cx="10958724" cy="926339"/>
+          </a:xfrm>
+          <a:prstGeom prst="rect">
+            <a:avLst/>
+          </a:prstGeom>
+          <a:noFill/>
+          <a:ln>
+            <a:noFill/>
+          </a:ln>
+        </p:spPr>
+        <p:txBody>
+          <a:bodyPr spcFirstLastPara="1" wrap="square" lIns="91425" tIns="45700" rIns="91425" bIns="45700" anchor="t" anchorCtr="0">
+            <a:noAutofit/>
+          </a:bodyPr>
+          <a:lstStyle/>
+          <a:p>
+            <a:pPr lvl="0" algn="just"/>
+            <a:r>
+              <a:rPr lang="en-US" sz="2200" dirty="0">
+                <a:solidFill>
+                  <a:schemeClr val="dk1"/>
+                </a:solidFill>
+                <a:latin typeface="Calibri"/>
+                <a:ea typeface="Calibri"/>
+                <a:cs typeface="Calibri"/>
+                <a:sym typeface="Calibri"/>
+              </a:rPr>
+              <a:t>Input cycle: less smooth regulation D signal</a:t>
+            </a:r>
+          </a:p>
+          <a:p>
+            <a:pPr lvl="0" algn="just"/>
+            <a:r>
+              <a:rPr lang="en-US" sz="2200" dirty="0">
+                <a:solidFill>
+                  <a:schemeClr val="dk1"/>
+                </a:solidFill>
+                <a:latin typeface="Calibri"/>
+                <a:ea typeface="Calibri"/>
+                <a:cs typeface="Calibri"/>
+                <a:sym typeface="Calibri"/>
+              </a:rPr>
+              <a:t>Results: Max residual -0.16% SOC, final residual -0.065% SOC</a:t>
+            </a:r>
+          </a:p>
+        </p:txBody>
+      </p:sp>
+      <p:pic>
+        <p:nvPicPr>
+          <p:cNvPr id="9" name="Picture 8" descr="A group of people on a map&#10;&#10;Description automatically generated">
+            <a:extLst>
+              <a:ext uri="{FF2B5EF4-FFF2-40B4-BE49-F238E27FC236}">
+                <a16:creationId xmlns:a16="http://schemas.microsoft.com/office/drawing/2014/main" id="{7E1EC87B-DD79-4C8C-86C2-12797FA5FFB0}"/>
+              </a:ext>
+            </a:extLst>
+          </p:cNvPr>
+          <p:cNvPicPr>
+            <a:picLocks noChangeAspect="1"/>
+          </p:cNvPicPr>
+          <p:nvPr/>
+        </p:nvPicPr>
+        <p:blipFill>
+          <a:blip r:embed="rId9"/>
+          <a:stretch>
+            <a:fillRect/>
+          </a:stretch>
+        </p:blipFill>
+        <p:spPr>
+          <a:xfrm>
+            <a:off x="16459200" y="17170666"/>
+            <a:ext cx="5504815" cy="3077265"/>
+          </a:xfrm>
+          <a:prstGeom prst="rect">
+            <a:avLst/>
+          </a:prstGeom>
+        </p:spPr>
+      </p:pic>
+      <p:pic>
+        <p:nvPicPr>
+          <p:cNvPr id="11" name="Picture 10" descr="A close up of a map&#10;&#10;Description automatically generated">
+            <a:extLst>
+              <a:ext uri="{FF2B5EF4-FFF2-40B4-BE49-F238E27FC236}">
+                <a16:creationId xmlns:a16="http://schemas.microsoft.com/office/drawing/2014/main" id="{D975E7A9-915B-4B53-AEAB-CF0848367220}"/>
+              </a:ext>
+            </a:extLst>
+          </p:cNvPr>
+          <p:cNvPicPr>
+            <a:picLocks noChangeAspect="1"/>
+          </p:cNvPicPr>
+          <p:nvPr/>
+        </p:nvPicPr>
+        <p:blipFill>
+          <a:blip r:embed="rId10"/>
+          <a:stretch>
+            <a:fillRect/>
+          </a:stretch>
+        </p:blipFill>
+        <p:spPr>
+          <a:xfrm>
+            <a:off x="10984403" y="17178245"/>
+            <a:ext cx="5485069" cy="3069686"/>
+          </a:xfrm>
+          <a:prstGeom prst="rect">
+            <a:avLst/>
+          </a:prstGeom>
+        </p:spPr>
+      </p:pic>
     </p:spTree>
   </p:cSld>
   <p:clrMapOvr>

</xml_diff>

<commit_message>
All sections filled in
</commit_message>
<xml_diff>
--- a/Project Poster.pptx
+++ b/Project Poster.pptx
@@ -246,7 +246,7 @@
       <p15:sldGuideLst xmlns:p15="http://schemas.microsoft.com/office/powerpoint/2012/main"/>
     </p:ext>
     <p:ext uri="http://customooxmlschemas.google.com/">
-      <go:slidesCustomData xmlns:go="http://customooxmlschemas.google.com/" xmlns:p15="http://schemas.microsoft.com/office/powerpoint/2012/main" xmlns:p14="http://schemas.microsoft.com/office/powerpoint/2010/main" xmlns:com="http://schemas.openxmlformats.org/drawingml/2006/compatibility" xmlns:pvml="urn:schemas-microsoft-com:office:powerpoint" xmlns:v="urn:schemas-microsoft-com:vml" xmlns:o="urn:schemas-microsoft-com:office:office" xmlns:dgm="http://schemas.openxmlformats.org/drawingml/2006/diagram" xmlns:c="http://schemas.openxmlformats.org/drawingml/2006/chart" xmlns:mv="urn:schemas-microsoft-com:mac:vml" xmlns:mc="http://schemas.openxmlformats.org/markup-compatibility/2006" xmlns="" r:id="rId7" roundtripDataSignature="AMtx7mia2HK9xto4cWUpRqy9HTZm6ngvMQ=="/>
+      <go:slidesCustomData xmlns="" xmlns:mc="http://schemas.openxmlformats.org/markup-compatibility/2006" xmlns:mv="urn:schemas-microsoft-com:mac:vml" xmlns:c="http://schemas.openxmlformats.org/drawingml/2006/chart" xmlns:dgm="http://schemas.openxmlformats.org/drawingml/2006/diagram" xmlns:o="urn:schemas-microsoft-com:office:office" xmlns:v="urn:schemas-microsoft-com:vml" xmlns:pvml="urn:schemas-microsoft-com:office:powerpoint" xmlns:com="http://schemas.openxmlformats.org/drawingml/2006/compatibility" xmlns:p14="http://schemas.microsoft.com/office/powerpoint/2010/main" xmlns:p15="http://schemas.microsoft.com/office/powerpoint/2012/main" xmlns:go="http://customooxmlschemas.google.com/" r:id="rId7" roundtripDataSignature="AMtx7mia2HK9xto4cWUpRqy9HTZm6ngvMQ=="/>
     </p:ext>
   </p:extLst>
 </p:presentation>
@@ -10544,22 +10544,8 @@
           </a:bodyPr>
           <a:lstStyle/>
           <a:p>
-            <a:pPr marL="0" lvl="0" indent="0" algn="ctr" rtl="0">
-              <a:lnSpc>
-                <a:spcPct val="90000"/>
-              </a:lnSpc>
-              <a:spcBef>
-                <a:spcPts val="0"/>
-              </a:spcBef>
-              <a:spcAft>
-                <a:spcPts val="0"/>
-              </a:spcAft>
-              <a:buClr>
-                <a:schemeClr val="dk1"/>
-              </a:buClr>
+            <a:pPr lvl="0" algn="ctr">
               <a:buSzPts val="6000"/>
-              <a:buFont typeface="Century"/>
-              <a:buNone/>
             </a:pPr>
             <a:r>
               <a:rPr lang="en-US" sz="6000" b="1" dirty="0">
@@ -10568,7 +10554,7 @@
                 <a:cs typeface="Century"/>
                 <a:sym typeface="Century"/>
               </a:rPr>
-              <a:t>Simple Efficiency Models for Battery Cell State of Charge Estimation</a:t>
+              <a:t>Characterizing Error in Linear Battery State of Charge Model</a:t>
             </a:r>
             <a:br>
               <a:rPr lang="en-US" sz="1333" b="1" dirty="0">
@@ -10642,8 +10628,8 @@
         </p:nvSpPr>
         <p:spPr>
           <a:xfrm>
-            <a:off x="1459525" y="10785929"/>
-            <a:ext cx="8422500" cy="10336645"/>
+            <a:off x="1459525" y="10498139"/>
+            <a:ext cx="9305354" cy="10624436"/>
           </a:xfrm>
           <a:prstGeom prst="rect">
             <a:avLst/>
@@ -10694,7 +10680,7 @@
         </p:nvSpPr>
         <p:spPr>
           <a:xfrm>
-            <a:off x="10621100" y="3992875"/>
+            <a:off x="11304360" y="3992875"/>
             <a:ext cx="11973900" cy="17129700"/>
           </a:xfrm>
           <a:prstGeom prst="rect">
@@ -10746,8 +10732,8 @@
         </p:nvSpPr>
         <p:spPr>
           <a:xfrm>
-            <a:off x="23359750" y="11428425"/>
-            <a:ext cx="8046300" cy="3976675"/>
+            <a:off x="23799222" y="12375930"/>
+            <a:ext cx="7606825" cy="1893413"/>
           </a:xfrm>
           <a:prstGeom prst="rect">
             <a:avLst/>
@@ -10840,7 +10826,7 @@
         </p:nvSpPr>
         <p:spPr>
           <a:xfrm>
-            <a:off x="1835725" y="11338163"/>
+            <a:off x="2277151" y="10842093"/>
             <a:ext cx="7670100" cy="605382"/>
           </a:xfrm>
           <a:prstGeom prst="rect">
@@ -10890,8 +10876,8 @@
         </p:nvSpPr>
         <p:spPr>
           <a:xfrm>
-            <a:off x="1459650" y="3987948"/>
-            <a:ext cx="8422500" cy="6175363"/>
+            <a:off x="1459649" y="3987949"/>
+            <a:ext cx="9305229" cy="5902811"/>
           </a:xfrm>
           <a:prstGeom prst="rect">
             <a:avLst/>
@@ -10948,8 +10934,8 @@
             </p:nvSpPr>
             <p:spPr>
               <a:xfrm>
-                <a:off x="1765400" y="12566163"/>
-                <a:ext cx="7670100" cy="7201931"/>
+                <a:off x="1873272" y="11543751"/>
+                <a:ext cx="8477859" cy="9607688"/>
               </a:xfrm>
               <a:prstGeom prst="rect">
                 <a:avLst/>
@@ -10965,74 +10951,13 @@
               </a:bodyPr>
               <a:lstStyle/>
               <a:p>
-                <a:pPr lvl="0"/>
+                <a:pPr lvl="0" algn="just">
+                  <a:spcBef>
+                    <a:spcPts val="1000"/>
+                  </a:spcBef>
+                </a:pPr>
                 <a:r>
-                  <a:rPr lang="en-US" sz="2200" b="1" dirty="0">
-                    <a:solidFill>
-                      <a:schemeClr val="dk1"/>
-                    </a:solidFill>
-                    <a:latin typeface="Calibri"/>
-                    <a:ea typeface="Calibri"/>
-                    <a:cs typeface="Calibri"/>
-                    <a:sym typeface="Calibri"/>
-                  </a:rPr>
-                  <a:t>Describe succinctly your approach</a:t>
-                </a:r>
-                <a:endParaRPr lang="en-US" sz="2200" dirty="0">
-                  <a:solidFill>
-                    <a:schemeClr val="dk1"/>
-                  </a:solidFill>
-                  <a:latin typeface="Calibri"/>
-                  <a:ea typeface="Calibri"/>
-                  <a:cs typeface="Calibri"/>
-                  <a:sym typeface="Calibri"/>
-                </a:endParaRPr>
-              </a:p>
-              <a:p>
-                <a:pPr lvl="0"/>
-                <a:r>
-                  <a:rPr lang="en-US" sz="2200" b="1" dirty="0">
-                    <a:solidFill>
-                      <a:schemeClr val="dk1"/>
-                    </a:solidFill>
-                    <a:latin typeface="Calibri"/>
-                    <a:ea typeface="Calibri"/>
-                    <a:cs typeface="Calibri"/>
-                    <a:sym typeface="Calibri"/>
-                  </a:rPr>
-                  <a:t>Describe inputs/outputs/data/components/tools (e.g. BDS) utilized</a:t>
-                </a:r>
-              </a:p>
-              <a:p>
-                <a:pPr lvl="0"/>
-                <a:r>
-                  <a:rPr lang="en-US" sz="2200" b="1" dirty="0">
-                    <a:solidFill>
-                      <a:schemeClr val="dk1"/>
-                    </a:solidFill>
-                    <a:latin typeface="Calibri"/>
-                    <a:ea typeface="Calibri"/>
-                    <a:cs typeface="Calibri"/>
-                    <a:sym typeface="Calibri"/>
-                  </a:rPr>
-                  <a:t>Contrast with existing literature/state of the art </a:t>
-                </a:r>
-              </a:p>
-              <a:p>
-                <a:pPr lvl="0"/>
-                <a:endParaRPr lang="en-US" sz="2200" dirty="0">
-                  <a:solidFill>
-                    <a:schemeClr val="dk1"/>
-                  </a:solidFill>
-                  <a:latin typeface="Calibri"/>
-                  <a:cs typeface="Calibri"/>
-                  <a:sym typeface="Calibri"/>
-                </a:endParaRPr>
-              </a:p>
-              <a:p>
-                <a:pPr lvl="0"/>
-                <a:r>
-                  <a:rPr lang="en-US" sz="2200" dirty="0">
+                  <a:rPr lang="en-US" sz="2400" b="1" dirty="0">
                     <a:solidFill>
                       <a:schemeClr val="dk1"/>
                     </a:solidFill>
@@ -11040,11 +10965,33 @@
                     <a:cs typeface="Calibri"/>
                     <a:sym typeface="Calibri"/>
                   </a:rPr>
-                  <a:t>As a “ground truth” we use the simulation results of the BDS (battery design studio) default NiMH cell ECM. We then compare the results of this to the results using a simple mathematical model for SOC with constant efficiency:</a:t>
+                  <a:t>Linear SOC estimation with constant efficiency coefficient</a:t>
                 </a:r>
               </a:p>
               <a:p>
-                <a:pPr lvl="0"/>
+                <a:pPr lvl="0" algn="just">
+                  <a:spcBef>
+                    <a:spcPts val="1000"/>
+                  </a:spcBef>
+                </a:pPr>
+                <a:r>
+                  <a:rPr lang="en-US" sz="2400" dirty="0">
+                    <a:solidFill>
+                      <a:schemeClr val="dk1"/>
+                    </a:solidFill>
+                    <a:latin typeface="Calibri"/>
+                    <a:cs typeface="Calibri"/>
+                    <a:sym typeface="Calibri"/>
+                  </a:rPr>
+                  <a:t>As a “ground truth” we use the simulation results of the BDS default NiMH cell ECM. We then compare the simulation SOC to the results using the following simple model:</a:t>
+                </a:r>
+              </a:p>
+              <a:p>
+                <a:pPr lvl="0" algn="just">
+                  <a:spcBef>
+                    <a:spcPts val="1000"/>
+                  </a:spcBef>
+                </a:pPr>
                 <a14:m>
                   <m:oMathPara xmlns:m="http://schemas.openxmlformats.org/officeDocument/2006/math">
                     <m:oMathParaPr>
@@ -11054,14 +11001,14 @@
                       <m:sSub>
                         <m:sSubPr>
                           <m:ctrlPr>
-                            <a:rPr lang="en-US" sz="2200" b="0" i="1" smtClean="0">
+                            <a:rPr lang="en-US" sz="2400" b="0" i="1" smtClean="0">
                               <a:latin typeface="Cambria Math" panose="02040503050406030204" pitchFamily="18" charset="0"/>
                             </a:rPr>
                           </m:ctrlPr>
                         </m:sSubPr>
                         <m:e>
                           <m:r>
-                            <a:rPr lang="en-US" sz="2200" b="0" i="1" smtClean="0">
+                            <a:rPr lang="en-US" sz="2400" b="0" i="1" smtClean="0">
                               <a:latin typeface="Cambria Math" panose="02040503050406030204" pitchFamily="18" charset="0"/>
                             </a:rPr>
                             <m:t>𝑄</m:t>
@@ -11069,7 +11016,7 @@
                         </m:e>
                         <m:sub>
                           <m:r>
-                            <a:rPr lang="en-US" sz="2200" b="0" i="1" smtClean="0">
+                            <a:rPr lang="en-US" sz="2400" b="0" i="1" smtClean="0">
                               <a:latin typeface="Cambria Math" panose="02040503050406030204" pitchFamily="18" charset="0"/>
                             </a:rPr>
                             <m:t>𝑡</m:t>
@@ -11077,7 +11024,7 @@
                         </m:sub>
                       </m:sSub>
                       <m:r>
-                        <a:rPr lang="en-US" sz="2200" b="0" i="1" smtClean="0">
+                        <a:rPr lang="en-US" sz="2400" b="0" i="1" smtClean="0">
                           <a:latin typeface="Cambria Math" panose="02040503050406030204" pitchFamily="18" charset="0"/>
                         </a:rPr>
                         <m:t>=</m:t>
@@ -11085,14 +11032,14 @@
                       <m:sSub>
                         <m:sSubPr>
                           <m:ctrlPr>
-                            <a:rPr lang="en-US" sz="2200" b="0" i="1" smtClean="0">
+                            <a:rPr lang="en-US" sz="2400" b="0" i="1" smtClean="0">
                               <a:latin typeface="Cambria Math" panose="02040503050406030204" pitchFamily="18" charset="0"/>
                             </a:rPr>
                           </m:ctrlPr>
                         </m:sSubPr>
                         <m:e>
                           <m:r>
-                            <a:rPr lang="en-US" sz="2200" b="0" i="1" smtClean="0">
+                            <a:rPr lang="en-US" sz="2400" b="0" i="1" smtClean="0">
                               <a:latin typeface="Cambria Math" panose="02040503050406030204" pitchFamily="18" charset="0"/>
                             </a:rPr>
                             <m:t>𝑄</m:t>
@@ -11100,13 +11047,13 @@
                         </m:e>
                         <m:sub>
                           <m:r>
-                            <a:rPr lang="en-US" sz="2200" b="0" i="1" smtClean="0">
+                            <a:rPr lang="en-US" sz="2400" b="0" i="1" smtClean="0">
                               <a:latin typeface="Cambria Math" panose="02040503050406030204" pitchFamily="18" charset="0"/>
                             </a:rPr>
                             <m:t>𝑡</m:t>
                           </m:r>
                           <m:r>
-                            <a:rPr lang="en-US" sz="2200" b="0" i="1" smtClean="0">
+                            <a:rPr lang="en-US" sz="2400" b="0" i="1" smtClean="0">
                               <a:latin typeface="Cambria Math" panose="02040503050406030204" pitchFamily="18" charset="0"/>
                             </a:rPr>
                             <m:t>−1</m:t>
@@ -11114,7 +11061,7 @@
                         </m:sub>
                       </m:sSub>
                       <m:r>
-                        <a:rPr lang="en-US" sz="2200" b="0" i="1" smtClean="0">
+                        <a:rPr lang="en-US" sz="2400" b="0" i="1" smtClean="0">
                           <a:latin typeface="Cambria Math" panose="02040503050406030204" pitchFamily="18" charset="0"/>
                         </a:rPr>
                         <m:t>+ </m:t>
@@ -11122,14 +11069,14 @@
                       <m:sSub>
                         <m:sSubPr>
                           <m:ctrlPr>
-                            <a:rPr lang="en-US" sz="2200" b="0" i="1" smtClean="0">
+                            <a:rPr lang="en-US" sz="2400" b="0" i="1" smtClean="0">
                               <a:latin typeface="Cambria Math" panose="02040503050406030204" pitchFamily="18" charset="0"/>
                             </a:rPr>
                           </m:ctrlPr>
                         </m:sSubPr>
                         <m:e>
                           <m:r>
-                            <a:rPr lang="en-US" sz="2200" b="0" i="1" smtClean="0">
+                            <a:rPr lang="en-US" sz="2400" b="0" i="1" smtClean="0">
                               <a:latin typeface="Cambria Math" panose="02040503050406030204" pitchFamily="18" charset="0"/>
                               <a:ea typeface="Cambria Math" panose="02040503050406030204" pitchFamily="18" charset="0"/>
                             </a:rPr>
@@ -11138,7 +11085,7 @@
                         </m:e>
                         <m:sub>
                           <m:r>
-                            <a:rPr lang="en-US" sz="2200" b="0" i="1" smtClean="0">
+                            <a:rPr lang="en-US" sz="2400" b="0" i="1" smtClean="0">
                               <a:latin typeface="Cambria Math" panose="02040503050406030204" pitchFamily="18" charset="0"/>
                             </a:rPr>
                             <m:t>𝑐</m:t>
@@ -11148,14 +11095,14 @@
                       <m:sSub>
                         <m:sSubPr>
                           <m:ctrlPr>
-                            <a:rPr lang="en-US" sz="2200" b="0" i="1" smtClean="0">
+                            <a:rPr lang="en-US" sz="2400" b="0" i="1" smtClean="0">
                               <a:latin typeface="Cambria Math" panose="02040503050406030204" pitchFamily="18" charset="0"/>
                             </a:rPr>
                           </m:ctrlPr>
                         </m:sSubPr>
                         <m:e>
                           <m:r>
-                            <a:rPr lang="en-US" sz="2200" b="0" i="1" smtClean="0">
+                            <a:rPr lang="en-US" sz="2400" b="0" i="1" smtClean="0">
                               <a:latin typeface="Cambria Math" panose="02040503050406030204" pitchFamily="18" charset="0"/>
                             </a:rPr>
                             <m:t>𝑐</m:t>
@@ -11163,7 +11110,7 @@
                         </m:e>
                         <m:sub>
                           <m:r>
-                            <a:rPr lang="en-US" sz="2200" b="0" i="1" smtClean="0">
+                            <a:rPr lang="en-US" sz="2400" b="0" i="1" smtClean="0">
                               <a:latin typeface="Cambria Math" panose="02040503050406030204" pitchFamily="18" charset="0"/>
                             </a:rPr>
                             <m:t>𝑡</m:t>
@@ -11171,21 +11118,21 @@
                         </m:sub>
                       </m:sSub>
                       <m:r>
-                        <a:rPr lang="en-US" sz="2200" b="0" i="1" smtClean="0">
+                        <a:rPr lang="en-US" sz="2400" b="0" i="1" smtClean="0">
                           <a:latin typeface="Cambria Math" panose="02040503050406030204" pitchFamily="18" charset="0"/>
                           <a:ea typeface="Cambria Math" panose="02040503050406030204" pitchFamily="18" charset="0"/>
                         </a:rPr>
                         <m:t>∆</m:t>
                       </m:r>
                       <m:r>
-                        <a:rPr lang="en-US" sz="2200" b="0" i="1" smtClean="0">
+                        <a:rPr lang="en-US" sz="2400" b="0" i="1" smtClean="0">
                           <a:latin typeface="Cambria Math" panose="02040503050406030204" pitchFamily="18" charset="0"/>
                           <a:ea typeface="Cambria Math" panose="02040503050406030204" pitchFamily="18" charset="0"/>
                         </a:rPr>
                         <m:t>𝑡</m:t>
                       </m:r>
                       <m:r>
-                        <a:rPr lang="en-US" sz="2200" b="0" i="1" smtClean="0">
+                        <a:rPr lang="en-US" sz="2400" b="0" i="1" smtClean="0">
                           <a:latin typeface="Cambria Math" panose="02040503050406030204" pitchFamily="18" charset="0"/>
                         </a:rPr>
                         <m:t>−</m:t>
@@ -11193,14 +11140,14 @@
                       <m:sSub>
                         <m:sSubPr>
                           <m:ctrlPr>
-                            <a:rPr lang="en-US" sz="2200" b="0" i="1" smtClean="0">
+                            <a:rPr lang="en-US" sz="2400" b="0" i="1" smtClean="0">
                               <a:latin typeface="Cambria Math" panose="02040503050406030204" pitchFamily="18" charset="0"/>
                             </a:rPr>
                           </m:ctrlPr>
                         </m:sSubPr>
                         <m:e>
                           <m:r>
-                            <a:rPr lang="en-US" sz="2200" b="0" i="1" smtClean="0">
+                            <a:rPr lang="en-US" sz="2400" b="0" i="1" smtClean="0">
                               <a:latin typeface="Cambria Math" panose="02040503050406030204" pitchFamily="18" charset="0"/>
                               <a:ea typeface="Cambria Math" panose="02040503050406030204" pitchFamily="18" charset="0"/>
                             </a:rPr>
@@ -11209,7 +11156,7 @@
                         </m:e>
                         <m:sub>
                           <m:r>
-                            <a:rPr lang="en-US" sz="2200" b="0" i="1" smtClean="0">
+                            <a:rPr lang="en-US" sz="2400" b="0" i="1" smtClean="0">
                               <a:latin typeface="Cambria Math" panose="02040503050406030204" pitchFamily="18" charset="0"/>
                             </a:rPr>
                             <m:t>𝑑</m:t>
@@ -11219,14 +11166,14 @@
                       <m:sSub>
                         <m:sSubPr>
                           <m:ctrlPr>
-                            <a:rPr lang="en-US" sz="2200" b="0" i="1" smtClean="0">
+                            <a:rPr lang="en-US" sz="2400" b="0" i="1" smtClean="0">
                               <a:latin typeface="Cambria Math" panose="02040503050406030204" pitchFamily="18" charset="0"/>
                             </a:rPr>
                           </m:ctrlPr>
                         </m:sSubPr>
                         <m:e>
                           <m:r>
-                            <a:rPr lang="en-US" sz="2200" b="0" i="1" smtClean="0">
+                            <a:rPr lang="en-US" sz="2400" b="0" i="1" smtClean="0">
                               <a:latin typeface="Cambria Math" panose="02040503050406030204" pitchFamily="18" charset="0"/>
                             </a:rPr>
                             <m:t>𝑑</m:t>
@@ -11234,7 +11181,7 @@
                         </m:e>
                         <m:sub>
                           <m:r>
-                            <a:rPr lang="en-US" sz="2200" b="0" i="1" smtClean="0">
+                            <a:rPr lang="en-US" sz="2400" b="0" i="1" smtClean="0">
                               <a:latin typeface="Cambria Math" panose="02040503050406030204" pitchFamily="18" charset="0"/>
                             </a:rPr>
                             <m:t>𝑡</m:t>
@@ -11242,14 +11189,14 @@
                         </m:sub>
                       </m:sSub>
                       <m:r>
-                        <a:rPr lang="en-US" sz="2200" i="1">
+                        <a:rPr lang="en-US" sz="2400" i="1">
                           <a:latin typeface="Cambria Math" panose="02040503050406030204" pitchFamily="18" charset="0"/>
                           <a:ea typeface="Cambria Math" panose="02040503050406030204" pitchFamily="18" charset="0"/>
                         </a:rPr>
                         <m:t>∆</m:t>
                       </m:r>
                       <m:r>
-                        <a:rPr lang="en-US" sz="2200" i="1">
+                        <a:rPr lang="en-US" sz="2400" i="1">
                           <a:latin typeface="Cambria Math" panose="02040503050406030204" pitchFamily="18" charset="0"/>
                           <a:ea typeface="Cambria Math" panose="02040503050406030204" pitchFamily="18" charset="0"/>
                         </a:rPr>
@@ -11258,89 +11205,121 @@
                     </m:oMath>
                   </m:oMathPara>
                 </a14:m>
-                <a:endParaRPr lang="en-US" sz="2200" b="0" dirty="0"/>
+                <a:endParaRPr lang="en-US" sz="2400" b="0" dirty="0"/>
               </a:p>
               <a:p>
-                <a:pPr lvl="0"/>
+                <a:pPr lvl="0" algn="just">
+                  <a:spcBef>
+                    <a:spcPts val="1000"/>
+                  </a:spcBef>
+                </a:pPr>
                 <a:r>
-                  <a:rPr lang="en-US" sz="2200" dirty="0">
+                  <a:rPr lang="en-US" sz="2400" dirty="0">
                     <a:latin typeface="Calibri" panose="020F0502020204030204" pitchFamily="34" charset="0"/>
                     <a:cs typeface="Calibri" panose="020F0502020204030204" pitchFamily="34" charset="0"/>
                   </a:rPr>
-                  <a:t>Where </a:t>
+                  <a:t>where </a:t>
                 </a:r>
                 <a:r>
-                  <a:rPr lang="en-US" sz="2200" i="1" dirty="0">
+                  <a:rPr lang="en-US" sz="2400" i="1" dirty="0">
                     <a:latin typeface="Calibri" panose="020F0502020204030204" pitchFamily="34" charset="0"/>
                     <a:cs typeface="Calibri" panose="020F0502020204030204" pitchFamily="34" charset="0"/>
                   </a:rPr>
                   <a:t>Q</a:t>
                 </a:r>
                 <a:r>
-                  <a:rPr lang="en-US" sz="2200" dirty="0">
+                  <a:rPr lang="en-US" sz="2400" dirty="0">
                     <a:latin typeface="Calibri" panose="020F0502020204030204" pitchFamily="34" charset="0"/>
                     <a:cs typeface="Calibri" panose="020F0502020204030204" pitchFamily="34" charset="0"/>
                   </a:rPr>
                   <a:t> is the state of charge, </a:t>
                 </a:r>
                 <a:r>
-                  <a:rPr lang="en-US" sz="2200" i="1" dirty="0">
+                  <a:rPr lang="en-US" sz="2400" i="1" dirty="0">
                     <a:latin typeface="Calibri" panose="020F0502020204030204" pitchFamily="34" charset="0"/>
                     <a:cs typeface="Calibri" panose="020F0502020204030204" pitchFamily="34" charset="0"/>
                   </a:rPr>
                   <a:t>c</a:t>
                 </a:r>
                 <a:r>
-                  <a:rPr lang="en-US" sz="2200" dirty="0">
+                  <a:rPr lang="en-US" sz="2400" dirty="0">
                     <a:latin typeface="Calibri" panose="020F0502020204030204" pitchFamily="34" charset="0"/>
                     <a:cs typeface="Calibri" panose="020F0502020204030204" pitchFamily="34" charset="0"/>
                   </a:rPr>
                   <a:t> is the charge rate, </a:t>
                 </a:r>
                 <a:r>
-                  <a:rPr lang="en-US" sz="2200" i="1" dirty="0">
+                  <a:rPr lang="en-US" sz="2400" i="1" dirty="0">
                     <a:latin typeface="Calibri" panose="020F0502020204030204" pitchFamily="34" charset="0"/>
                     <a:cs typeface="Calibri" panose="020F0502020204030204" pitchFamily="34" charset="0"/>
                   </a:rPr>
                   <a:t>d</a:t>
                 </a:r>
                 <a:r>
-                  <a:rPr lang="en-US" sz="2200" dirty="0">
+                  <a:rPr lang="en-US" sz="2400" dirty="0">
                     <a:latin typeface="Calibri" panose="020F0502020204030204" pitchFamily="34" charset="0"/>
                     <a:cs typeface="Calibri" panose="020F0502020204030204" pitchFamily="34" charset="0"/>
                   </a:rPr>
                   <a:t> is the discharge rate, </a:t>
                 </a:r>
                 <a:r>
-                  <a:rPr lang="el-GR" sz="2200" i="1" dirty="0">
+                  <a:rPr lang="el-GR" sz="2400" i="1" dirty="0">
                     <a:latin typeface="Calibri" panose="020F0502020204030204" pitchFamily="34" charset="0"/>
                     <a:cs typeface="Calibri" panose="020F0502020204030204" pitchFamily="34" charset="0"/>
                   </a:rPr>
                   <a:t>ϒ</a:t>
                 </a:r>
                 <a:r>
-                  <a:rPr lang="en-US" sz="2200" dirty="0">
+                  <a:rPr lang="en-US" sz="2400" i="1" baseline="-25000" dirty="0">
+                    <a:latin typeface="Calibri" panose="020F0502020204030204" pitchFamily="34" charset="0"/>
+                    <a:cs typeface="Calibri" panose="020F0502020204030204" pitchFamily="34" charset="0"/>
+                  </a:rPr>
+                  <a:t>c</a:t>
+                </a:r>
+                <a:r>
+                  <a:rPr lang="en-US" sz="2400" dirty="0">
+                    <a:latin typeface="Calibri" panose="020F0502020204030204" pitchFamily="34" charset="0"/>
+                    <a:cs typeface="Calibri" panose="020F0502020204030204" pitchFamily="34" charset="0"/>
+                  </a:rPr>
+                  <a:t> and </a:t>
+                </a:r>
+                <a:r>
+                  <a:rPr lang="el-GR" sz="2400" i="1" dirty="0">
+                    <a:latin typeface="Calibri" panose="020F0502020204030204" pitchFamily="34" charset="0"/>
+                    <a:cs typeface="Calibri" panose="020F0502020204030204" pitchFamily="34" charset="0"/>
+                  </a:rPr>
+                  <a:t>ϒ</a:t>
+                </a:r>
+                <a:r>
+                  <a:rPr lang="en-US" sz="2400" i="1" baseline="-25000" dirty="0">
+                    <a:latin typeface="Calibri" panose="020F0502020204030204" pitchFamily="34" charset="0"/>
+                    <a:cs typeface="Calibri" panose="020F0502020204030204" pitchFamily="34" charset="0"/>
+                  </a:rPr>
+                  <a:t>d</a:t>
+                </a:r>
+                <a:r>
+                  <a:rPr lang="en-US" sz="2400" dirty="0">
                     <a:latin typeface="Calibri" panose="020F0502020204030204" pitchFamily="34" charset="0"/>
                     <a:cs typeface="Calibri" panose="020F0502020204030204" pitchFamily="34" charset="0"/>
                   </a:rPr>
                   <a:t> are the charge and discharge efficiencies, and </a:t>
                 </a:r>
                 <a:r>
-                  <a:rPr lang="el-GR" sz="2200" i="1" dirty="0">
+                  <a:rPr lang="el-GR" sz="2400" i="1" dirty="0">
                     <a:latin typeface="Calibri" panose="020F0502020204030204" pitchFamily="34" charset="0"/>
                     <a:cs typeface="Calibri" panose="020F0502020204030204" pitchFamily="34" charset="0"/>
                   </a:rPr>
                   <a:t>Δ</a:t>
                 </a:r>
                 <a:r>
-                  <a:rPr lang="en-US" sz="2200" i="1" dirty="0">
+                  <a:rPr lang="en-US" sz="2400" i="1" dirty="0">
                     <a:latin typeface="Calibri" panose="020F0502020204030204" pitchFamily="34" charset="0"/>
                     <a:cs typeface="Calibri" panose="020F0502020204030204" pitchFamily="34" charset="0"/>
                   </a:rPr>
                   <a:t>t</a:t>
                 </a:r>
                 <a:r>
-                  <a:rPr lang="en-US" sz="2200" dirty="0">
+                  <a:rPr lang="en-US" sz="2400" dirty="0">
                     <a:latin typeface="Calibri" panose="020F0502020204030204" pitchFamily="34" charset="0"/>
                     <a:cs typeface="Calibri" panose="020F0502020204030204" pitchFamily="34" charset="0"/>
                   </a:rPr>
@@ -11348,67 +11327,192 @@
                 </a:r>
               </a:p>
               <a:p>
-                <a:pPr lvl="0"/>
-                <a:endParaRPr lang="en-US" sz="2200" dirty="0">
-                  <a:latin typeface="Calibri" panose="020F0502020204030204" pitchFamily="34" charset="0"/>
-                  <a:cs typeface="Calibri" panose="020F0502020204030204" pitchFamily="34" charset="0"/>
-                </a:endParaRPr>
-              </a:p>
-              <a:p>
-                <a:pPr lvl="0"/>
+                <a:pPr lvl="0" algn="just">
+                  <a:spcBef>
+                    <a:spcPts val="1000"/>
+                  </a:spcBef>
+                </a:pPr>
                 <a:r>
-                  <a:rPr lang="en-US" sz="2200" dirty="0">
+                  <a:rPr lang="en-US" sz="2400" dirty="0">
                     <a:latin typeface="Calibri" panose="020F0502020204030204" pitchFamily="34" charset="0"/>
                     <a:cs typeface="Calibri" panose="020F0502020204030204" pitchFamily="34" charset="0"/>
                   </a:rPr>
-                  <a:t>In order to calculate the efficiencies, we use a pulse charge and discharge cycle, so that </a:t>
+                  <a:t>To calculate </a:t>
                 </a:r>
                 <a:r>
-                  <a:rPr lang="en-US" sz="2200" i="1" dirty="0">
+                  <a:rPr lang="el-GR" sz="2400" i="1" dirty="0">
+                    <a:latin typeface="Calibri" panose="020F0502020204030204" pitchFamily="34" charset="0"/>
+                    <a:cs typeface="Calibri" panose="020F0502020204030204" pitchFamily="34" charset="0"/>
+                  </a:rPr>
+                  <a:t>ϒ</a:t>
+                </a:r>
+                <a:r>
+                  <a:rPr lang="en-US" sz="2400" i="1" baseline="-25000" dirty="0">
                     <a:latin typeface="Calibri" panose="020F0502020204030204" pitchFamily="34" charset="0"/>
                     <a:cs typeface="Calibri" panose="020F0502020204030204" pitchFamily="34" charset="0"/>
                   </a:rPr>
                   <a:t>c</a:t>
                 </a:r>
                 <a:r>
-                  <a:rPr lang="en-US" sz="2200" dirty="0">
+                  <a:rPr lang="en-US" sz="2400" dirty="0">
                     <a:latin typeface="Calibri" panose="020F0502020204030204" pitchFamily="34" charset="0"/>
                     <a:cs typeface="Calibri" panose="020F0502020204030204" pitchFamily="34" charset="0"/>
                   </a:rPr>
                   <a:t> and </a:t>
                 </a:r>
                 <a:r>
-                  <a:rPr lang="en-US" sz="2200" i="1" dirty="0">
+                  <a:rPr lang="el-GR" sz="2400" i="1" dirty="0">
+                    <a:latin typeface="Calibri" panose="020F0502020204030204" pitchFamily="34" charset="0"/>
+                    <a:cs typeface="Calibri" panose="020F0502020204030204" pitchFamily="34" charset="0"/>
+                  </a:rPr>
+                  <a:t>ϒ</a:t>
+                </a:r>
+                <a:r>
+                  <a:rPr lang="en-US" sz="2400" i="1" baseline="-25000" dirty="0">
                     <a:latin typeface="Calibri" panose="020F0502020204030204" pitchFamily="34" charset="0"/>
                     <a:cs typeface="Calibri" panose="020F0502020204030204" pitchFamily="34" charset="0"/>
                   </a:rPr>
                   <a:t>d</a:t>
                 </a:r>
                 <a:r>
-                  <a:rPr lang="en-US" sz="2200" dirty="0">
+                  <a:rPr lang="en-US" sz="2400" dirty="0">
                     <a:latin typeface="Calibri" panose="020F0502020204030204" pitchFamily="34" charset="0"/>
                     <a:cs typeface="Calibri" panose="020F0502020204030204" pitchFamily="34" charset="0"/>
                   </a:rPr>
-                  <a:t> are each constant for many time steps in a row.</a:t>
+                  <a:t>, we use a pulse cycle in BDS, so that </a:t>
+                </a:r>
+                <a:r>
+                  <a:rPr lang="en-US" sz="2400" i="1" dirty="0">
+                    <a:latin typeface="Calibri" panose="020F0502020204030204" pitchFamily="34" charset="0"/>
+                    <a:cs typeface="Calibri" panose="020F0502020204030204" pitchFamily="34" charset="0"/>
+                  </a:rPr>
+                  <a:t>c</a:t>
+                </a:r>
+                <a:r>
+                  <a:rPr lang="en-US" sz="2400" dirty="0">
+                    <a:latin typeface="Calibri" panose="020F0502020204030204" pitchFamily="34" charset="0"/>
+                    <a:cs typeface="Calibri" panose="020F0502020204030204" pitchFamily="34" charset="0"/>
+                  </a:rPr>
+                  <a:t> and </a:t>
+                </a:r>
+                <a:r>
+                  <a:rPr lang="en-US" sz="2400" i="1" dirty="0">
+                    <a:latin typeface="Calibri" panose="020F0502020204030204" pitchFamily="34" charset="0"/>
+                    <a:cs typeface="Calibri" panose="020F0502020204030204" pitchFamily="34" charset="0"/>
+                  </a:rPr>
+                  <a:t>d</a:t>
+                </a:r>
+                <a:r>
+                  <a:rPr lang="en-US" sz="2400" dirty="0">
+                    <a:latin typeface="Calibri" panose="020F0502020204030204" pitchFamily="34" charset="0"/>
+                    <a:cs typeface="Calibri" panose="020F0502020204030204" pitchFamily="34" charset="0"/>
+                  </a:rPr>
+                  <a:t> are each constant for long time periods.</a:t>
                 </a:r>
               </a:p>
               <a:p>
-                <a:pPr lvl="0"/>
-                <a:endParaRPr lang="en-US" sz="2200" dirty="0">
-                  <a:latin typeface="Calibri" panose="020F0502020204030204" pitchFamily="34" charset="0"/>
-                  <a:cs typeface="Calibri" panose="020F0502020204030204" pitchFamily="34" charset="0"/>
-                </a:endParaRPr>
-              </a:p>
-              <a:p>
-                <a:pPr lvl="0"/>
+                <a:pPr lvl="0" algn="just">
+                  <a:spcBef>
+                    <a:spcPts val="1000"/>
+                  </a:spcBef>
+                </a:pPr>
                 <a:r>
-                  <a:rPr lang="en-US" sz="2200" dirty="0">
+                  <a:rPr lang="en-US" sz="2400" dirty="0">
                     <a:latin typeface="Calibri" panose="020F0502020204030204" pitchFamily="34" charset="0"/>
                     <a:cs typeface="Calibri" panose="020F0502020204030204" pitchFamily="34" charset="0"/>
                   </a:rPr>
-                  <a:t>To evaluate the accuracy, we then use these efficiencies to predict the SOC with realistic charge and discharge cycles, and compare to the BDS results with the same cycles.</a:t>
+                  <a:t>To evaluate the accuracy, we then use these </a:t>
                 </a:r>
-                <a:endParaRPr sz="2200" dirty="0">
+                <a:r>
+                  <a:rPr lang="el-GR" sz="2400" i="1" dirty="0">
+                    <a:latin typeface="Calibri" panose="020F0502020204030204" pitchFamily="34" charset="0"/>
+                    <a:cs typeface="Calibri" panose="020F0502020204030204" pitchFamily="34" charset="0"/>
+                  </a:rPr>
+                  <a:t>ϒ</a:t>
+                </a:r>
+                <a:r>
+                  <a:rPr lang="en-US" sz="2400" i="1" baseline="-25000" dirty="0">
+                    <a:latin typeface="Calibri" panose="020F0502020204030204" pitchFamily="34" charset="0"/>
+                    <a:cs typeface="Calibri" panose="020F0502020204030204" pitchFamily="34" charset="0"/>
+                  </a:rPr>
+                  <a:t>c</a:t>
+                </a:r>
+                <a:r>
+                  <a:rPr lang="en-US" sz="2400" dirty="0">
+                    <a:latin typeface="Calibri" panose="020F0502020204030204" pitchFamily="34" charset="0"/>
+                    <a:cs typeface="Calibri" panose="020F0502020204030204" pitchFamily="34" charset="0"/>
+                  </a:rPr>
+                  <a:t> and </a:t>
+                </a:r>
+                <a:r>
+                  <a:rPr lang="el-GR" sz="2400" i="1" dirty="0">
+                    <a:latin typeface="Calibri" panose="020F0502020204030204" pitchFamily="34" charset="0"/>
+                    <a:cs typeface="Calibri" panose="020F0502020204030204" pitchFamily="34" charset="0"/>
+                  </a:rPr>
+                  <a:t>ϒ</a:t>
+                </a:r>
+                <a:r>
+                  <a:rPr lang="en-US" sz="2400" i="1" baseline="-25000" dirty="0">
+                    <a:latin typeface="Calibri" panose="020F0502020204030204" pitchFamily="34" charset="0"/>
+                    <a:cs typeface="Calibri" panose="020F0502020204030204" pitchFamily="34" charset="0"/>
+                  </a:rPr>
+                  <a:t>d</a:t>
+                </a:r>
+                <a:r>
+                  <a:rPr lang="en-US" sz="2400" dirty="0">
+                    <a:latin typeface="Calibri" panose="020F0502020204030204" pitchFamily="34" charset="0"/>
+                    <a:cs typeface="Calibri" panose="020F0502020204030204" pitchFamily="34" charset="0"/>
+                  </a:rPr>
+                  <a:t> to predict the SOC with realistic charge cycles, and compare to the BDS results with the same cycles.</a:t>
+                </a:r>
+              </a:p>
+              <a:p>
+                <a:pPr lvl="0" algn="just">
+                  <a:spcBef>
+                    <a:spcPts val="1000"/>
+                  </a:spcBef>
+                </a:pPr>
+                <a:r>
+                  <a:rPr lang="en-US" sz="2400" dirty="0">
+                    <a:latin typeface="Calibri" panose="020F0502020204030204" pitchFamily="34" charset="0"/>
+                    <a:cs typeface="Calibri" panose="020F0502020204030204" pitchFamily="34" charset="0"/>
+                  </a:rPr>
+                  <a:t>The accuracy is measured as residuals, or error in % SOC, at each time step. Error accumulates at each time step, so the final residual value is a good indicator of accuracy for the time period.</a:t>
+                </a:r>
+              </a:p>
+              <a:p>
+                <a:pPr algn="just">
+                  <a:spcBef>
+                    <a:spcPts val="1000"/>
+                  </a:spcBef>
+                </a:pPr>
+                <a:r>
+                  <a:rPr lang="en-US" sz="2400" b="1" dirty="0">
+                    <a:solidFill>
+                      <a:schemeClr val="dk1"/>
+                    </a:solidFill>
+                    <a:latin typeface="Calibri"/>
+                    <a:ea typeface="Calibri"/>
+                    <a:cs typeface="Calibri"/>
+                    <a:sym typeface="Calibri"/>
+                  </a:rPr>
+                  <a:t>Additional battery modeling in literature</a:t>
+                </a:r>
+              </a:p>
+              <a:p>
+                <a:pPr lvl="0" algn="just">
+                  <a:spcBef>
+                    <a:spcPts val="1000"/>
+                  </a:spcBef>
+                </a:pPr>
+                <a:r>
+                  <a:rPr lang="en-US" sz="2400" dirty="0">
+                    <a:latin typeface="Calibri" panose="020F0502020204030204" pitchFamily="34" charset="0"/>
+                    <a:cs typeface="Calibri" panose="020F0502020204030204" pitchFamily="34" charset="0"/>
+                  </a:rPr>
+                  <a:t>Existing literature mostly focuses on a constant efficiency term that affects the resistive component of an ECM, or assumes the constant efficiency we analyze here in order to do other experiments. One exception is a mathematical model with piecewise efficiency terms [1].</a:t>
+                </a:r>
+                <a:endParaRPr sz="2400" dirty="0">
                   <a:latin typeface="Calibri" panose="020F0502020204030204" pitchFamily="34" charset="0"/>
                   <a:cs typeface="Calibri" panose="020F0502020204030204" pitchFamily="34" charset="0"/>
                 </a:endParaRPr>
@@ -11427,8 +11531,8 @@
             </p:nvSpPr>
             <p:spPr>
               <a:xfrm>
-                <a:off x="1765400" y="12566163"/>
-                <a:ext cx="7670100" cy="7201931"/>
+                <a:off x="1873272" y="11543751"/>
+                <a:ext cx="8477859" cy="9607688"/>
               </a:xfrm>
               <a:prstGeom prst="rect">
                 <a:avLst/>
@@ -11436,7 +11540,7 @@
               <a:blipFill>
                 <a:blip r:embed="rId3"/>
                 <a:stretch>
-                  <a:fillRect l="-1033" t="-508" r="-397" b="-761"/>
+                  <a:fillRect l="-1078" r="-1150"/>
                 </a:stretch>
               </a:blipFill>
               <a:ln>
@@ -11572,7 +11676,7 @@
         </p:nvSpPr>
         <p:spPr>
           <a:xfrm>
-            <a:off x="11148650" y="4351382"/>
+            <a:off x="11831910" y="4351382"/>
             <a:ext cx="10568400" cy="689700"/>
           </a:xfrm>
           <a:prstGeom prst="rect">
@@ -11622,8 +11726,8 @@
         </p:nvSpPr>
         <p:spPr>
           <a:xfrm>
-            <a:off x="23359775" y="3895450"/>
-            <a:ext cx="8046300" cy="7045200"/>
+            <a:off x="23799224" y="3987948"/>
+            <a:ext cx="7606825" cy="7916339"/>
           </a:xfrm>
           <a:prstGeom prst="rect">
             <a:avLst/>
@@ -11678,7 +11782,7 @@
         </p:nvSpPr>
         <p:spPr>
           <a:xfrm>
-            <a:off x="23762525" y="12190875"/>
+            <a:off x="24018983" y="12681044"/>
             <a:ext cx="7167300" cy="1708600"/>
           </a:xfrm>
           <a:prstGeom prst="rect">
@@ -11765,7 +11869,7 @@
               <a:buNone/>
             </a:pPr>
             <a:r>
-              <a:rPr lang="en-US" sz="2200" b="1" dirty="0">
+              <a:rPr lang="en-US" sz="2400" dirty="0">
                 <a:solidFill>
                   <a:schemeClr val="dk1"/>
                 </a:solidFill>
@@ -11774,9 +11878,9 @@
                 <a:cs typeface="Calibri"/>
                 <a:sym typeface="Calibri"/>
               </a:rPr>
-              <a:t>Thomas Navidi</a:t>
+              <a:t>Thank you to our mentor, Thomas Navidi.</a:t>
             </a:r>
-            <a:endParaRPr sz="2200" dirty="0">
+            <a:endParaRPr sz="2400" dirty="0">
               <a:solidFill>
                 <a:schemeClr val="lt1"/>
               </a:solidFill>
@@ -11816,8 +11920,8 @@
         </p:nvSpPr>
         <p:spPr>
           <a:xfrm>
-            <a:off x="23762525" y="4341175"/>
-            <a:ext cx="7167300" cy="6066600"/>
+            <a:off x="24191763" y="4208280"/>
+            <a:ext cx="6832579" cy="7078586"/>
           </a:xfrm>
           <a:prstGeom prst="rect">
             <a:avLst/>
@@ -11875,41 +11979,107 @@
               </a:buClr>
               <a:buSzPts val="2200"/>
             </a:pPr>
-            <a:endParaRPr lang="en-US" sz="2200" dirty="0">
+            <a:endParaRPr lang="en-US" sz="2400" dirty="0">
               <a:latin typeface="Calibri" panose="020F0502020204030204" pitchFamily="34" charset="0"/>
               <a:cs typeface="Calibri" panose="020F0502020204030204" pitchFamily="34" charset="0"/>
             </a:endParaRPr>
           </a:p>
           <a:p>
             <a:pPr marL="88900" lvl="0" algn="just">
+              <a:spcAft>
+                <a:spcPts val="600"/>
+              </a:spcAft>
               <a:buClr>
                 <a:schemeClr val="dk1"/>
               </a:buClr>
               <a:buSzPts val="2200"/>
             </a:pPr>
             <a:r>
-              <a:rPr lang="en-US" sz="2200" b="1" dirty="0">
+              <a:rPr lang="en-US" sz="2400" b="1" dirty="0">
                 <a:latin typeface="Calibri" panose="020F0502020204030204" pitchFamily="34" charset="0"/>
                 <a:cs typeface="Calibri" panose="020F0502020204030204" pitchFamily="34" charset="0"/>
               </a:rPr>
-              <a:t>Summarize key takeaways</a:t>
+              <a:t>Key takeaways</a:t>
+            </a:r>
+          </a:p>
+          <a:p>
+            <a:pPr marL="431800" lvl="0" indent="-342900" algn="just">
+              <a:spcAft>
+                <a:spcPts val="600"/>
+              </a:spcAft>
+              <a:buClr>
+                <a:schemeClr val="dk1"/>
+              </a:buClr>
+              <a:buSzPts val="2200"/>
+              <a:buFont typeface="Arial" panose="020B0604020202020204" pitchFamily="34" charset="0"/>
+              <a:buChar char="•"/>
+            </a:pPr>
+            <a:r>
+              <a:rPr lang="en-US" sz="2400" dirty="0">
+                <a:latin typeface="Calibri" panose="020F0502020204030204" pitchFamily="34" charset="0"/>
+                <a:cs typeface="Calibri" panose="020F0502020204030204" pitchFamily="34" charset="0"/>
+              </a:rPr>
+              <a:t>In more smooth/regular cycles, the absolute error in SOC due to efficiency approximation is less than 1%.</a:t>
+            </a:r>
+          </a:p>
+          <a:p>
+            <a:pPr marL="431800" lvl="0" indent="-342900" algn="just">
+              <a:spcAft>
+                <a:spcPts val="600"/>
+              </a:spcAft>
+              <a:buClr>
+                <a:schemeClr val="dk1"/>
+              </a:buClr>
+              <a:buSzPts val="2200"/>
+              <a:buFont typeface="Arial" panose="020B0604020202020204" pitchFamily="34" charset="0"/>
+              <a:buChar char="•"/>
+            </a:pPr>
+            <a:r>
+              <a:rPr lang="en-US" sz="2400" dirty="0">
+                <a:latin typeface="Calibri" panose="020F0502020204030204" pitchFamily="34" charset="0"/>
+                <a:cs typeface="Calibri" panose="020F0502020204030204" pitchFamily="34" charset="0"/>
+              </a:rPr>
+              <a:t>In cycles with higher variation, the absolute error in SOC increases.</a:t>
+            </a:r>
+          </a:p>
+          <a:p>
+            <a:pPr marL="431800" lvl="0" indent="-342900" algn="just">
+              <a:spcAft>
+                <a:spcPts val="600"/>
+              </a:spcAft>
+              <a:buClr>
+                <a:schemeClr val="dk1"/>
+              </a:buClr>
+              <a:buSzPts val="2200"/>
+              <a:buFont typeface="Arial" panose="020B0604020202020204" pitchFamily="34" charset="0"/>
+              <a:buChar char="•"/>
+            </a:pPr>
+            <a:r>
+              <a:rPr lang="en-US" sz="2400" dirty="0">
+                <a:latin typeface="Calibri" panose="020F0502020204030204" pitchFamily="34" charset="0"/>
+                <a:cs typeface="Calibri" panose="020F0502020204030204" pitchFamily="34" charset="0"/>
+              </a:rPr>
+              <a:t>The actual error in real measurements is a result of noise and inaccurate current measurements, in addition to SOC estimation.</a:t>
             </a:r>
           </a:p>
           <a:p>
             <a:pPr marL="88900" lvl="0" algn="just">
+              <a:spcAft>
+                <a:spcPts val="600"/>
+              </a:spcAft>
               <a:buClr>
                 <a:schemeClr val="dk1"/>
               </a:buClr>
               <a:buSzPts val="2200"/>
             </a:pPr>
             <a:r>
-              <a:rPr lang="en-US" sz="2200" b="1" dirty="0">
+              <a:rPr lang="en-US" sz="2400" b="1" dirty="0">
                 <a:latin typeface="Calibri" panose="020F0502020204030204" pitchFamily="34" charset="0"/>
                 <a:cs typeface="Calibri" panose="020F0502020204030204" pitchFamily="34" charset="0"/>
               </a:rPr>
-              <a:t>Identify key next steps </a:t>
+              <a:t>Future steps </a:t>
             </a:r>
-            <a:endParaRPr sz="2200" b="1" dirty="0">
+            <a:endParaRPr sz="2400" b="1" dirty="0">
               <a:solidFill>
                 <a:schemeClr val="dk1"/>
               </a:solidFill>
@@ -11920,24 +12090,55 @@
             </a:endParaRPr>
           </a:p>
           <a:p>
-            <a:pPr marL="0" marR="0" lvl="0" indent="0" algn="l" rtl="0">
-              <a:spcBef>
-                <a:spcPts val="0"/>
-              </a:spcBef>
-              <a:spcAft>
-                <a:spcPts val="1000"/>
-              </a:spcAft>
-              <a:buNone/>
+            <a:pPr marL="431800" lvl="0" indent="-342900" algn="just">
+              <a:spcAft>
+                <a:spcPts val="600"/>
+              </a:spcAft>
+              <a:buSzPts val="2200"/>
+              <a:buFont typeface="Arial" panose="020B0604020202020204" pitchFamily="34" charset="0"/>
+              <a:buChar char="•"/>
             </a:pPr>
-            <a:endParaRPr sz="3334" b="1" dirty="0">
-              <a:solidFill>
-                <a:schemeClr val="dk1"/>
-              </a:solidFill>
-              <a:latin typeface="Century"/>
-              <a:ea typeface="Century"/>
-              <a:cs typeface="Century"/>
-              <a:sym typeface="Century"/>
-            </a:endParaRPr>
+            <a:r>
+              <a:rPr lang="en-US" sz="2400" dirty="0">
+                <a:latin typeface="Calibri" panose="020F0502020204030204" pitchFamily="34" charset="0"/>
+                <a:cs typeface="Calibri" panose="020F0502020204030204" pitchFamily="34" charset="0"/>
+              </a:rPr>
+              <a:t>Evaluate additional models for efficiency as a function of temperature, SOC, etc.</a:t>
+            </a:r>
+          </a:p>
+          <a:p>
+            <a:pPr marL="431800" lvl="0" indent="-342900" algn="just">
+              <a:spcAft>
+                <a:spcPts val="600"/>
+              </a:spcAft>
+              <a:buSzPts val="2200"/>
+              <a:buFont typeface="Arial" panose="020B0604020202020204" pitchFamily="34" charset="0"/>
+              <a:buChar char="•"/>
+            </a:pPr>
+            <a:r>
+              <a:rPr lang="en-US" sz="2400" dirty="0">
+                <a:latin typeface="Calibri" panose="020F0502020204030204" pitchFamily="34" charset="0"/>
+                <a:cs typeface="Calibri" panose="020F0502020204030204" pitchFamily="34" charset="0"/>
+              </a:rPr>
+              <a:t>Observe effects on entire battery pack as opposed to single cell.</a:t>
+            </a:r>
+          </a:p>
+          <a:p>
+            <a:pPr marL="431800" lvl="0" indent="-342900" algn="just">
+              <a:spcAft>
+                <a:spcPts val="600"/>
+              </a:spcAft>
+              <a:buSzPts val="2200"/>
+              <a:buFont typeface="Arial" panose="020B0604020202020204" pitchFamily="34" charset="0"/>
+              <a:buChar char="•"/>
+            </a:pPr>
+            <a:r>
+              <a:rPr lang="en-US" sz="2400" dirty="0">
+                <a:latin typeface="Calibri" panose="020F0502020204030204" pitchFamily="34" charset="0"/>
+                <a:cs typeface="Calibri" panose="020F0502020204030204" pitchFamily="34" charset="0"/>
+              </a:rPr>
+              <a:t>Observe accuracy for transportation battery cycles.</a:t>
+            </a:r>
           </a:p>
         </p:txBody>
       </p:sp>
@@ -11949,8 +12150,8 @@
         </p:nvSpPr>
         <p:spPr>
           <a:xfrm>
-            <a:off x="1835825" y="4111638"/>
-            <a:ext cx="7670100" cy="6175362"/>
+            <a:off x="1808479" y="4510971"/>
+            <a:ext cx="8607444" cy="5213328"/>
           </a:xfrm>
           <a:prstGeom prst="rect">
             <a:avLst/>
@@ -11966,52 +12167,16 @@
           </a:bodyPr>
           <a:lstStyle/>
           <a:p>
-            <a:pPr marL="0" lvl="0" indent="0" algn="ctr" rtl="0">
-              <a:spcBef>
-                <a:spcPts val="0"/>
-              </a:spcBef>
-              <a:spcAft>
-                <a:spcPts val="0"/>
-              </a:spcAft>
-              <a:buClr>
-                <a:schemeClr val="dk1"/>
-              </a:buClr>
-              <a:buFont typeface="Arial"/>
-              <a:buNone/>
+            <a:pPr lvl="0" algn="just">
+              <a:spcBef>
+                <a:spcPts val="1000"/>
+              </a:spcBef>
+              <a:buClr>
+                <a:schemeClr val="dk1"/>
+              </a:buClr>
             </a:pPr>
             <a:r>
-              <a:rPr lang="en-US" sz="3300" b="1" dirty="0">
-                <a:solidFill>
-                  <a:schemeClr val="dk1"/>
-                </a:solidFill>
-                <a:latin typeface="Century"/>
-                <a:ea typeface="Century"/>
-                <a:cs typeface="Century"/>
-                <a:sym typeface="Century"/>
-              </a:rPr>
-              <a:t>Motivation</a:t>
-            </a:r>
-            <a:endParaRPr sz="2200" dirty="0">
-              <a:solidFill>
-                <a:schemeClr val="dk1"/>
-              </a:solidFill>
-              <a:latin typeface="Calibri"/>
-              <a:ea typeface="Calibri"/>
-              <a:cs typeface="Calibri"/>
-              <a:sym typeface="Calibri"/>
-            </a:endParaRPr>
-          </a:p>
-          <a:p>
-            <a:pPr lvl="0" algn="just">
-              <a:spcBef>
-                <a:spcPts val="1000"/>
-              </a:spcBef>
-              <a:buClr>
-                <a:schemeClr val="dk1"/>
-              </a:buClr>
-            </a:pPr>
-            <a:r>
-              <a:rPr lang="en-US" sz="2200" b="1" dirty="0">
+              <a:rPr lang="en-US" sz="2400" b="1" dirty="0">
                 <a:solidFill>
                   <a:schemeClr val="dk1"/>
                 </a:solidFill>
@@ -12033,7 +12198,7 @@
               </a:buClr>
             </a:pPr>
             <a:r>
-              <a:rPr lang="en-US" sz="2200" dirty="0">
+              <a:rPr lang="en-US" sz="2400" dirty="0">
                 <a:solidFill>
                   <a:schemeClr val="dk1"/>
                 </a:solidFill>
@@ -12042,7 +12207,7 @@
                 <a:cs typeface="Calibri"/>
                 <a:sym typeface="Calibri"/>
               </a:rPr>
-              <a:t>Battery state of charge (SOC) cannot be measured directly in practice, and yet it is important to know in all transportation and grid applications. While complex models of batteries and equivalent circuit models (ECMs) offer more accurate results, approximations that can be applied to real batteries easily are used often. The simplest approximation is a constant efficiency value equal to the ratio of effective charge to input charge.</a:t>
+              <a:t>Battery state of charge (SOC) cannot be measured directly in practice, and yet it is important in all battery applications. While complex models of batteries and equivalent circuit models (ECMs) offer more accurate results, mathematical approximations are used often. The simplest approximation is efficiency as a constant coefficient of charge.</a:t>
             </a:r>
           </a:p>
           <a:p>
@@ -12055,7 +12220,7 @@
               </a:buClr>
             </a:pPr>
             <a:r>
-              <a:rPr lang="en-US" sz="2200" b="1" dirty="0">
+              <a:rPr lang="en-US" sz="2400" b="1" dirty="0">
                 <a:solidFill>
                   <a:schemeClr val="dk1"/>
                 </a:solidFill>
@@ -12079,7 +12244,7 @@
               <a:buChar char="•"/>
             </a:pPr>
             <a:r>
-              <a:rPr lang="en-US" sz="2200" dirty="0">
+              <a:rPr lang="en-US" sz="2400" dirty="0">
                 <a:solidFill>
                   <a:schemeClr val="dk1"/>
                 </a:solidFill>
@@ -12090,7 +12255,7 @@
               </a:rPr>
               <a:t>How accurate is the approximation of a constant efficiency as the coefficient of charge or discharge current?</a:t>
             </a:r>
-            <a:endParaRPr lang="en-US" sz="3334" dirty="0">
+            <a:endParaRPr lang="en-US" sz="2400" dirty="0">
               <a:solidFill>
                 <a:schemeClr val="dk1"/>
               </a:solidFill>
@@ -12112,7 +12277,7 @@
               <a:buChar char="•"/>
             </a:pPr>
             <a:r>
-              <a:rPr lang="en-US" sz="2200" dirty="0">
+              <a:rPr lang="en-US" sz="2400" dirty="0">
                 <a:solidFill>
                   <a:schemeClr val="dk1"/>
                 </a:solidFill>
@@ -12123,7 +12288,7 @@
               </a:rPr>
               <a:t>Are other simple mathematical models of efficiency able to better approximate the battery SOC?</a:t>
             </a:r>
-            <a:endParaRPr lang="en-US" sz="2200" dirty="0">
+            <a:endParaRPr lang="en-US" sz="2400" dirty="0">
               <a:solidFill>
                 <a:schemeClr val="dk1"/>
               </a:solidFill>
@@ -12149,8 +12314,8 @@
         </p:nvSpPr>
         <p:spPr>
           <a:xfrm>
-            <a:off x="23359750" y="15892875"/>
-            <a:ext cx="8046300" cy="5229699"/>
+            <a:off x="23799224" y="14740986"/>
+            <a:ext cx="7606826" cy="6381588"/>
           </a:xfrm>
           <a:prstGeom prst="rect">
             <a:avLst/>
@@ -12211,8 +12376,8 @@
         </p:nvSpPr>
         <p:spPr>
           <a:xfrm>
-            <a:off x="23799250" y="16350925"/>
-            <a:ext cx="7167300" cy="1708600"/>
+            <a:off x="24186344" y="15200164"/>
+            <a:ext cx="6832579" cy="5514975"/>
           </a:xfrm>
           <a:prstGeom prst="rect">
             <a:avLst/>
@@ -12253,14 +12418,15 @@
               </a:rPr>
               <a:t>Bibliography</a:t>
             </a:r>
-            <a:endParaRPr dirty="0">
+            <a:endParaRPr lang="en-US" b="1" dirty="0">
               <a:solidFill>
                 <a:schemeClr val="dk1"/>
               </a:solidFill>
+              <a:ea typeface="Century"/>
             </a:endParaRPr>
           </a:p>
           <a:p>
-            <a:pPr marL="0" lvl="0" indent="0" algn="l" rtl="0">
+            <a:pPr marL="0" lvl="0" indent="0" algn="ctr" rtl="0">
               <a:spcBef>
                 <a:spcPts val="0"/>
               </a:spcBef>
@@ -12284,18 +12450,116 @@
             </a:endParaRPr>
           </a:p>
           <a:p>
-            <a:pPr marL="0" lvl="0" indent="0" algn="just" rtl="0">
-              <a:spcBef>
-                <a:spcPts val="0"/>
-              </a:spcBef>
-              <a:spcAft>
-                <a:spcPts val="0"/>
-              </a:spcAft>
-              <a:buClr>
-                <a:schemeClr val="dk1"/>
-              </a:buClr>
-              <a:buFont typeface="Arial"/>
-              <a:buNone/>
+            <a:pPr lvl="0" algn="just">
+              <a:spcAft>
+                <a:spcPts val="600"/>
+              </a:spcAft>
+              <a:buClr>
+                <a:schemeClr val="dk1"/>
+              </a:buClr>
+            </a:pPr>
+            <a:r>
+              <a:rPr lang="en-US" sz="2400" dirty="0">
+                <a:solidFill>
+                  <a:schemeClr val="dk1"/>
+                </a:solidFill>
+                <a:latin typeface="Calibri"/>
+                <a:ea typeface="Calibri"/>
+                <a:cs typeface="Calibri"/>
+                <a:sym typeface="Calibri"/>
+              </a:rPr>
+              <a:t>[</a:t>
+            </a:r>
+            <a:r>
+              <a:rPr lang="en-US" sz="2200" dirty="0">
+                <a:solidFill>
+                  <a:schemeClr val="dk1"/>
+                </a:solidFill>
+                <a:latin typeface="Calibri"/>
+                <a:ea typeface="Calibri"/>
+                <a:cs typeface="Calibri"/>
+                <a:sym typeface="Calibri"/>
+              </a:rPr>
+              <a:t>1] N. </a:t>
+            </a:r>
+            <a:r>
+              <a:rPr lang="en-US" sz="2200" dirty="0" err="1">
+                <a:solidFill>
+                  <a:schemeClr val="dk1"/>
+                </a:solidFill>
+                <a:latin typeface="Calibri"/>
+                <a:ea typeface="Calibri"/>
+                <a:cs typeface="Calibri"/>
+                <a:sym typeface="Calibri"/>
+              </a:rPr>
+              <a:t>DiOrio</a:t>
+            </a:r>
+            <a:r>
+              <a:rPr lang="en-US" sz="2200" dirty="0">
+                <a:solidFill>
+                  <a:schemeClr val="dk1"/>
+                </a:solidFill>
+                <a:latin typeface="Calibri"/>
+                <a:ea typeface="Calibri"/>
+                <a:cs typeface="Calibri"/>
+                <a:sym typeface="Calibri"/>
+              </a:rPr>
+              <a:t>, A. </a:t>
+            </a:r>
+            <a:r>
+              <a:rPr lang="en-US" sz="2200" dirty="0" err="1">
+                <a:solidFill>
+                  <a:schemeClr val="dk1"/>
+                </a:solidFill>
+                <a:latin typeface="Calibri"/>
+                <a:ea typeface="Calibri"/>
+                <a:cs typeface="Calibri"/>
+                <a:sym typeface="Calibri"/>
+              </a:rPr>
+              <a:t>Dobos</a:t>
+            </a:r>
+            <a:r>
+              <a:rPr lang="en-US" sz="2200" dirty="0">
+                <a:solidFill>
+                  <a:schemeClr val="dk1"/>
+                </a:solidFill>
+                <a:latin typeface="Calibri"/>
+                <a:ea typeface="Calibri"/>
+                <a:cs typeface="Calibri"/>
+                <a:sym typeface="Calibri"/>
+              </a:rPr>
+              <a:t>, S. </a:t>
+            </a:r>
+            <a:r>
+              <a:rPr lang="en-US" sz="2200" dirty="0" err="1">
+                <a:solidFill>
+                  <a:schemeClr val="dk1"/>
+                </a:solidFill>
+                <a:latin typeface="Calibri"/>
+                <a:ea typeface="Calibri"/>
+                <a:cs typeface="Calibri"/>
+                <a:sym typeface="Calibri"/>
+              </a:rPr>
+              <a:t>Janzou</a:t>
+            </a:r>
+            <a:r>
+              <a:rPr lang="en-US" sz="2200" dirty="0">
+                <a:solidFill>
+                  <a:schemeClr val="dk1"/>
+                </a:solidFill>
+                <a:latin typeface="Calibri"/>
+                <a:ea typeface="Calibri"/>
+                <a:cs typeface="Calibri"/>
+                <a:sym typeface="Calibri"/>
+              </a:rPr>
+              <a:t>, A. Nelson, and B. Lundstrom, “Technoeconomic Modeling of Battery Energy Storage in SAM”, National Renewable Energy Laboratory, Tech. Report. TP-6A20-64641, Sep. 2015.</a:t>
+            </a:r>
+          </a:p>
+          <a:p>
+            <a:pPr lvl="0">
+              <a:spcAft>
+                <a:spcPts val="600"/>
+              </a:spcAft>
             </a:pPr>
             <a:r>
               <a:rPr lang="en-US" sz="2200" dirty="0">
@@ -12307,72 +12571,15 @@
                 <a:cs typeface="Calibri"/>
                 <a:sym typeface="Calibri"/>
               </a:rPr>
-              <a:t>That one paper with piecewise efficiency model, and the sources for regulation / daily peak shifting data</a:t>
+              <a:t>[2] W. Powell and H. Cheng. Workshop, “Co-optimization of battery storage over multiple revenue streams and time scales.” PENSA Laboratory, Princeton University, Princeton, NJ, Jun. 21, 2015.</a:t>
             </a:r>
-            <a:endParaRPr sz="2200" dirty="0">
-              <a:solidFill>
-                <a:schemeClr val="lt1"/>
-              </a:solidFill>
-              <a:latin typeface="Calibri"/>
-              <a:ea typeface="Calibri"/>
-              <a:cs typeface="Calibri"/>
-              <a:sym typeface="Calibri"/>
-            </a:endParaRPr>
           </a:p>
           <a:p>
-            <a:pPr marL="0" marR="0" lvl="0" indent="0" algn="l" rtl="0">
-              <a:spcBef>
-                <a:spcPts val="0"/>
-              </a:spcBef>
-              <a:spcAft>
-                <a:spcPts val="1000"/>
-              </a:spcAft>
-              <a:buNone/>
+            <a:pPr lvl="0">
+              <a:spcAft>
+                <a:spcPts val="600"/>
+              </a:spcAft>
             </a:pPr>
-            <a:endParaRPr sz="2400" b="1" dirty="0">
-              <a:solidFill>
-                <a:schemeClr val="dk1"/>
-              </a:solidFill>
-              <a:latin typeface="Calibri"/>
-              <a:ea typeface="Calibri"/>
-              <a:cs typeface="Calibri"/>
-              <a:sym typeface="Calibri"/>
-            </a:endParaRPr>
-          </a:p>
-        </p:txBody>
-      </p:sp>
-      <p:sp>
-        <p:nvSpPr>
-          <p:cNvPr id="40" name="Google Shape;93;p1">
-            <a:extLst>
-              <a:ext uri="{FF2B5EF4-FFF2-40B4-BE49-F238E27FC236}">
-                <a16:creationId xmlns:a16="http://schemas.microsoft.com/office/drawing/2014/main" id="{8D62FC65-65A8-4C77-865B-94AFF39CAFDF}"/>
-              </a:ext>
-            </a:extLst>
-          </p:cNvPr>
-          <p:cNvSpPr txBox="1"/>
-          <p:nvPr/>
-        </p:nvSpPr>
-        <p:spPr>
-          <a:xfrm>
-            <a:off x="1835725" y="20387413"/>
-            <a:ext cx="7670100" cy="430847"/>
-          </a:xfrm>
-          <a:prstGeom prst="rect">
-            <a:avLst/>
-          </a:prstGeom>
-          <a:noFill/>
-          <a:ln>
-            <a:noFill/>
-          </a:ln>
-        </p:spPr>
-        <p:txBody>
-          <a:bodyPr spcFirstLastPara="1" wrap="square" lIns="91425" tIns="45700" rIns="91425" bIns="45700" anchor="t" anchorCtr="0">
-            <a:spAutoFit/>
-          </a:bodyPr>
-          <a:lstStyle/>
-          <a:p>
-            <a:pPr lvl="0"/>
             <a:r>
               <a:rPr lang="en-US" sz="2200" dirty="0">
                 <a:solidFill>
@@ -12383,9 +12590,48 @@
                 <a:cs typeface="Calibri"/>
                 <a:sym typeface="Calibri"/>
               </a:rPr>
-              <a:t>Put plots of input cycles here?</a:t>
+              <a:t>[3] E. </a:t>
             </a:r>
-            <a:endParaRPr sz="2200" dirty="0"/>
+            <a:r>
+              <a:rPr lang="en-US" sz="2200" dirty="0" err="1">
+                <a:solidFill>
+                  <a:schemeClr val="dk1"/>
+                </a:solidFill>
+                <a:latin typeface="Calibri"/>
+                <a:ea typeface="Calibri"/>
+                <a:cs typeface="Calibri"/>
+                <a:sym typeface="Calibri"/>
+              </a:rPr>
+              <a:t>Raszmann</a:t>
+            </a:r>
+            <a:r>
+              <a:rPr lang="en-US" sz="2200" dirty="0">
+                <a:solidFill>
+                  <a:schemeClr val="dk1"/>
+                </a:solidFill>
+                <a:latin typeface="Calibri"/>
+                <a:ea typeface="Calibri"/>
+                <a:cs typeface="Calibri"/>
+                <a:sym typeface="Calibri"/>
+              </a:rPr>
+              <a:t>, K. Baker, Y. Shi, and D. Christensen, “Modeling Stationary Lithium-Ion Batteries for Optimization and Predictive Control” National Renewable Energy Laboratory, Tech. Report. CP-5D00-67809, Feb. 2017.</a:t>
+            </a:r>
+          </a:p>
+          <a:p>
+            <a:pPr lvl="0">
+              <a:spcAft>
+                <a:spcPts val="1000"/>
+              </a:spcAft>
+            </a:pPr>
+            <a:endParaRPr sz="2400" dirty="0">
+              <a:solidFill>
+                <a:schemeClr val="dk1"/>
+              </a:solidFill>
+              <a:latin typeface="Calibri"/>
+              <a:ea typeface="Calibri"/>
+              <a:cs typeface="Calibri"/>
+              <a:sym typeface="Calibri"/>
+            </a:endParaRPr>
           </a:p>
         </p:txBody>
       </p:sp>
@@ -12403,7 +12649,7 @@
         </p:nvSpPr>
         <p:spPr>
           <a:xfrm>
-            <a:off x="11148650" y="5163450"/>
+            <a:off x="11831910" y="5163450"/>
             <a:ext cx="10985100" cy="536244"/>
           </a:xfrm>
           <a:prstGeom prst="rect">
@@ -12422,7 +12668,7 @@
           <a:p>
             <a:pPr lvl="0" algn="just"/>
             <a:r>
-              <a:rPr lang="en-US" sz="2200" b="1" dirty="0">
+              <a:rPr lang="en-US" sz="2400" b="1" dirty="0">
                 <a:solidFill>
                   <a:schemeClr val="dk1"/>
                 </a:solidFill>
@@ -12433,7 +12679,7 @@
               </a:rPr>
               <a:t>Calculating efficiency terms</a:t>
             </a:r>
-            <a:endParaRPr sz="2200" b="1" dirty="0"/>
+            <a:endParaRPr sz="2400" b="1" dirty="0"/>
           </a:p>
         </p:txBody>
       </p:sp>
@@ -12466,7 +12712,7 @@
         </p:blipFill>
         <p:spPr bwMode="auto">
           <a:xfrm>
-            <a:off x="11327401" y="5765319"/>
+            <a:off x="12010661" y="5765319"/>
             <a:ext cx="5131800" cy="2623468"/>
           </a:xfrm>
           <a:prstGeom prst="rect">
@@ -12498,7 +12744,7 @@
         </p:nvSpPr>
         <p:spPr>
           <a:xfrm>
-            <a:off x="16809246" y="5699694"/>
+            <a:off x="17492506" y="5699694"/>
             <a:ext cx="5543579" cy="2952240"/>
           </a:xfrm>
           <a:prstGeom prst="rect">
@@ -12632,7 +12878,7 @@
         </p:nvSpPr>
         <p:spPr>
           <a:xfrm>
-            <a:off x="11148650" y="8660382"/>
+            <a:off x="11831910" y="8660382"/>
             <a:ext cx="10985100" cy="536244"/>
           </a:xfrm>
           <a:prstGeom prst="rect">
@@ -12651,7 +12897,7 @@
           <a:p>
             <a:pPr lvl="0" algn="just"/>
             <a:r>
-              <a:rPr lang="en-US" sz="2200" b="1" dirty="0">
+              <a:rPr lang="en-US" sz="2400" b="1" dirty="0">
                 <a:solidFill>
                   <a:schemeClr val="dk1"/>
                 </a:solidFill>
@@ -12662,7 +12908,7 @@
               </a:rPr>
               <a:t>Evaluating accuracy: compare BDS to linear efficiency SOC prediction</a:t>
             </a:r>
-            <a:endParaRPr sz="2200" b="1" dirty="0"/>
+            <a:endParaRPr sz="2400" b="1" dirty="0"/>
           </a:p>
         </p:txBody>
       </p:sp>
@@ -12680,7 +12926,7 @@
         </p:nvSpPr>
         <p:spPr>
           <a:xfrm>
-            <a:off x="11128688" y="12420256"/>
+            <a:off x="11811948" y="12420256"/>
             <a:ext cx="10958724" cy="926339"/>
           </a:xfrm>
           <a:prstGeom prst="rect">
@@ -12750,7 +12996,7 @@
         </p:blipFill>
         <p:spPr>
           <a:xfrm>
-            <a:off x="10993977" y="9286924"/>
+            <a:off x="11677237" y="9286924"/>
             <a:ext cx="5582180" cy="3175416"/>
           </a:xfrm>
           <a:prstGeom prst="rect">
@@ -12780,7 +13026,7 @@
         </p:blipFill>
         <p:spPr>
           <a:xfrm>
-            <a:off x="16277642" y="9284066"/>
+            <a:off x="16960902" y="9284066"/>
             <a:ext cx="5638476" cy="3168764"/>
           </a:xfrm>
           <a:prstGeom prst="rect">
@@ -12802,7 +13048,7 @@
         </p:nvSpPr>
         <p:spPr>
           <a:xfrm>
-            <a:off x="11096795" y="16266921"/>
+            <a:off x="11780055" y="16266921"/>
             <a:ext cx="10958724" cy="926339"/>
           </a:xfrm>
           <a:prstGeom prst="rect">
@@ -12872,7 +13118,7 @@
         </p:blipFill>
         <p:spPr>
           <a:xfrm>
-            <a:off x="16368758" y="13298323"/>
+            <a:off x="17052018" y="13298323"/>
             <a:ext cx="5547360" cy="2991192"/>
           </a:xfrm>
           <a:prstGeom prst="rect">
@@ -12902,7 +13148,7 @@
         </p:blipFill>
         <p:spPr>
           <a:xfrm>
-            <a:off x="10993977" y="13303359"/>
+            <a:off x="11677237" y="13303359"/>
             <a:ext cx="5465922" cy="2981121"/>
           </a:xfrm>
           <a:prstGeom prst="rect">
@@ -12924,7 +13170,7 @@
         </p:nvSpPr>
         <p:spPr>
           <a:xfrm>
-            <a:off x="11128688" y="20179050"/>
+            <a:off x="11811948" y="20179050"/>
             <a:ext cx="10958724" cy="926339"/>
           </a:xfrm>
           <a:prstGeom prst="rect">
@@ -12967,7 +13213,7 @@
                 <a:cs typeface="Calibri"/>
                 <a:sym typeface="Calibri"/>
               </a:rPr>
-              <a:t>Results: Max residual -0.16% SOC, final residual -0.065% SOC</a:t>
+              <a:t>Results: Max residual 4.1% SOC, final residual 1.2% SOC</a:t>
             </a:r>
           </a:p>
         </p:txBody>
@@ -12994,7 +13240,7 @@
         </p:blipFill>
         <p:spPr>
           <a:xfrm>
-            <a:off x="16459200" y="17170666"/>
+            <a:off x="17142460" y="17170666"/>
             <a:ext cx="5504815" cy="3077265"/>
           </a:xfrm>
           <a:prstGeom prst="rect">
@@ -13024,7 +13270,7 @@
         </p:blipFill>
         <p:spPr>
           <a:xfrm>
-            <a:off x="10984403" y="17178245"/>
+            <a:off x="11667663" y="17178245"/>
             <a:ext cx="5485069" cy="3069686"/>
           </a:xfrm>
           <a:prstGeom prst="rect">
@@ -13032,6 +13278,62 @@
           </a:prstGeom>
         </p:spPr>
       </p:pic>
+      <p:sp>
+        <p:nvSpPr>
+          <p:cNvPr id="32" name="Google Shape;89;p1">
+            <a:extLst>
+              <a:ext uri="{FF2B5EF4-FFF2-40B4-BE49-F238E27FC236}">
+                <a16:creationId xmlns:a16="http://schemas.microsoft.com/office/drawing/2014/main" id="{BACCA1CE-41B0-48D2-8E91-927A23F808AB}"/>
+              </a:ext>
+            </a:extLst>
+          </p:cNvPr>
+          <p:cNvSpPr txBox="1"/>
+          <p:nvPr/>
+        </p:nvSpPr>
+        <p:spPr>
+          <a:xfrm>
+            <a:off x="1873272" y="4208280"/>
+            <a:ext cx="8477859" cy="605382"/>
+          </a:xfrm>
+          <a:prstGeom prst="rect">
+            <a:avLst/>
+          </a:prstGeom>
+          <a:noFill/>
+          <a:ln>
+            <a:noFill/>
+          </a:ln>
+        </p:spPr>
+        <p:txBody>
+          <a:bodyPr spcFirstLastPara="1" wrap="square" lIns="91425" tIns="45700" rIns="91425" bIns="45700" anchor="t" anchorCtr="0">
+            <a:spAutoFit/>
+          </a:bodyPr>
+          <a:lstStyle/>
+          <a:p>
+            <a:pPr marL="0" marR="0" lvl="0" indent="0" algn="ctr" rtl="0">
+              <a:spcBef>
+                <a:spcPts val="0"/>
+              </a:spcBef>
+              <a:spcAft>
+                <a:spcPts val="0"/>
+              </a:spcAft>
+              <a:buNone/>
+            </a:pPr>
+            <a:r>
+              <a:rPr lang="en-US" sz="3334" b="1" dirty="0">
+                <a:solidFill>
+                  <a:schemeClr val="dk1"/>
+                </a:solidFill>
+                <a:latin typeface="Century"/>
+                <a:ea typeface="Century"/>
+                <a:cs typeface="Century"/>
+                <a:sym typeface="Century"/>
+              </a:rPr>
+              <a:t>Motivation</a:t>
+            </a:r>
+            <a:endParaRPr dirty="0"/>
+          </a:p>
+        </p:txBody>
+      </p:sp>
     </p:spTree>
   </p:cSld>
   <p:clrMapOvr>

</xml_diff>